<commit_message>
powerpoint fini à 90% (inscription tâche manquant)
</commit_message>
<xml_diff>
--- a/TeamShare.pptx
+++ b/TeamShare.pptx
@@ -1,29 +1,30 @@
 
 <file path=ppt/presentation.xml><?xml version="1.0" encoding="utf-8"?>
-<p:presentation xmlns:a="http://schemas.openxmlformats.org/drawingml/2006/main" xmlns:r="http://schemas.openxmlformats.org/officeDocument/2006/relationships" xmlns:p="http://schemas.openxmlformats.org/presentationml/2006/main" saveSubsetFonts="1">
+<p:presentation xmlns:a="http://schemas.openxmlformats.org/drawingml/2006/main" xmlns:r="http://schemas.openxmlformats.org/officeDocument/2006/relationships" xmlns:p="http://schemas.openxmlformats.org/presentationml/2006/main" showSpecialPlsOnTitleSld="0" saveSubsetFonts="1">
   <p:sldMasterIdLst>
     <p:sldMasterId id="2147484356" r:id="rId1"/>
   </p:sldMasterIdLst>
   <p:notesMasterIdLst>
-    <p:notesMasterId r:id="rId18"/>
+    <p:notesMasterId r:id="rId19"/>
   </p:notesMasterIdLst>
   <p:sldIdLst>
     <p:sldId id="256" r:id="rId2"/>
     <p:sldId id="264" r:id="rId3"/>
     <p:sldId id="265" r:id="rId4"/>
     <p:sldId id="257" r:id="rId5"/>
-    <p:sldId id="263" r:id="rId6"/>
-    <p:sldId id="259" r:id="rId7"/>
-    <p:sldId id="266" r:id="rId8"/>
-    <p:sldId id="267" r:id="rId9"/>
-    <p:sldId id="269" r:id="rId10"/>
-    <p:sldId id="270" r:id="rId11"/>
+    <p:sldId id="259" r:id="rId6"/>
+    <p:sldId id="266" r:id="rId7"/>
+    <p:sldId id="267" r:id="rId8"/>
+    <p:sldId id="269" r:id="rId9"/>
+    <p:sldId id="270" r:id="rId10"/>
+    <p:sldId id="275" r:id="rId11"/>
     <p:sldId id="273" r:id="rId12"/>
     <p:sldId id="260" r:id="rId13"/>
     <p:sldId id="271" r:id="rId14"/>
     <p:sldId id="272" r:id="rId15"/>
     <p:sldId id="261" r:id="rId16"/>
     <p:sldId id="262" r:id="rId17"/>
+    <p:sldId id="274" r:id="rId18"/>
   </p:sldIdLst>
   <p:sldSz cx="12192000" cy="6858000"/>
   <p:notesSz cx="6858000" cy="9144000"/>
@@ -212,7 +213,7 @@
           <a:p>
             <a:fld id="{5ED2D057-9827-4CAD-AA45-6CF87F841162}" type="datetimeFigureOut">
               <a:rPr lang="en-US" smtClean="0"/>
-              <a:t>2/10/2015</a:t>
+              <a:t>2/11/2015</a:t>
             </a:fld>
             <a:endParaRPr lang="en-US"/>
           </a:p>
@@ -545,6 +546,90 @@
           <a:p>
             <a:fld id="{C4985354-ADDB-49C2-BF5E-1195144A1289}" type="slidenum">
               <a:rPr lang="en-US" smtClean="0"/>
+              <a:t>1</a:t>
+            </a:fld>
+            <a:endParaRPr lang="en-US"/>
+          </a:p>
+        </p:txBody>
+      </p:sp>
+    </p:spTree>
+    <p:extLst>
+      <p:ext uri="{BB962C8B-B14F-4D97-AF65-F5344CB8AC3E}">
+        <p14:creationId xmlns:p14="http://schemas.microsoft.com/office/powerpoint/2010/main" val="741380556"/>
+      </p:ext>
+    </p:extLst>
+  </p:cSld>
+  <p:clrMapOvr>
+    <a:masterClrMapping/>
+  </p:clrMapOvr>
+</p:notes>
+</file>
+
+<file path=ppt/notesSlides/notesSlide2.xml><?xml version="1.0" encoding="utf-8"?>
+<p:notes xmlns:a="http://schemas.openxmlformats.org/drawingml/2006/main" xmlns:r="http://schemas.openxmlformats.org/officeDocument/2006/relationships" xmlns:p="http://schemas.openxmlformats.org/presentationml/2006/main">
+  <p:cSld>
+    <p:spTree>
+      <p:nvGrpSpPr>
+        <p:cNvPr id="1" name=""/>
+        <p:cNvGrpSpPr/>
+        <p:nvPr/>
+      </p:nvGrpSpPr>
+      <p:grpSpPr>
+        <a:xfrm>
+          <a:off x="0" y="0"/>
+          <a:ext cx="0" cy="0"/>
+          <a:chOff x="0" y="0"/>
+          <a:chExt cx="0" cy="0"/>
+        </a:xfrm>
+      </p:grpSpPr>
+      <p:sp>
+        <p:nvSpPr>
+          <p:cNvPr id="2" name="Espace réservé de l'image des diapositives 1"/>
+          <p:cNvSpPr>
+            <a:spLocks noGrp="1" noRot="1" noChangeAspect="1"/>
+          </p:cNvSpPr>
+          <p:nvPr>
+            <p:ph type="sldImg"/>
+          </p:nvPr>
+        </p:nvSpPr>
+        <p:spPr/>
+      </p:sp>
+      <p:sp>
+        <p:nvSpPr>
+          <p:cNvPr id="3" name="Espace réservé des commentaires 2"/>
+          <p:cNvSpPr>
+            <a:spLocks noGrp="1"/>
+          </p:cNvSpPr>
+          <p:nvPr>
+            <p:ph type="body" idx="1"/>
+          </p:nvPr>
+        </p:nvSpPr>
+        <p:spPr/>
+        <p:txBody>
+          <a:bodyPr/>
+          <a:lstStyle/>
+          <a:p>
+            <a:endParaRPr lang="en-US"/>
+          </a:p>
+        </p:txBody>
+      </p:sp>
+      <p:sp>
+        <p:nvSpPr>
+          <p:cNvPr id="4" name="Espace réservé du numéro de diapositive 3"/>
+          <p:cNvSpPr>
+            <a:spLocks noGrp="1"/>
+          </p:cNvSpPr>
+          <p:nvPr>
+            <p:ph type="sldNum" sz="quarter" idx="10"/>
+          </p:nvPr>
+        </p:nvSpPr>
+        <p:spPr/>
+        <p:txBody>
+          <a:bodyPr/>
+          <a:lstStyle/>
+          <a:p>
+            <a:fld id="{C4985354-ADDB-49C2-BF5E-1195144A1289}" type="slidenum">
+              <a:rPr lang="en-US" smtClean="0"/>
               <a:t>2</a:t>
             </a:fld>
             <a:endParaRPr lang="en-US"/>
@@ -753,9 +838,9 @@
           <a:bodyPr/>
           <a:lstStyle/>
           <a:p>
-            <a:fld id="{20DD261B-0120-4341-A0C2-65169F639A00}" type="datetime1">
-              <a:rPr lang="fr-FR" smtClean="0"/>
-              <a:t>10/02/2015</a:t>
+            <a:fld id="{FFCC14D7-51CC-4D31-9C3F-72EFC714E4D3}" type="datetime1">
+              <a:rPr lang="fr-FR" smtClean="0"/>
+              <a:t>11/02/2015</a:t>
             </a:fld>
             <a:endParaRPr lang="fr-FR"/>
           </a:p>
@@ -988,6 +1073,18 @@
   <p:clrMapOvr>
     <a:masterClrMapping/>
   </p:clrMapOvr>
+  <mc:AlternateContent xmlns:mc="http://schemas.openxmlformats.org/markup-compatibility/2006">
+    <mc:Choice xmlns:p14="http://schemas.microsoft.com/office/powerpoint/2010/main" Requires="p14">
+      <p:transition spd="slow" p14:dur="1600">
+        <p14:conveyor dir="l"/>
+      </p:transition>
+    </mc:Choice>
+    <mc:Fallback>
+      <p:transition spd="slow">
+        <p:fade/>
+      </p:transition>
+    </mc:Fallback>
+  </mc:AlternateContent>
 </p:sldLayout>
 </file>
 
@@ -1189,9 +1286,9 @@
           <a:bodyPr/>
           <a:lstStyle/>
           <a:p>
-            <a:fld id="{D5EC52A5-2BC7-4B04-8F96-4B9C05C04B69}" type="datetime1">
-              <a:rPr lang="fr-FR" smtClean="0"/>
-              <a:t>10/02/2015</a:t>
+            <a:fld id="{485643C5-706F-449C-AD23-B91AC3C68C77}" type="datetime1">
+              <a:rPr lang="fr-FR" smtClean="0"/>
+              <a:t>11/02/2015</a:t>
             </a:fld>
             <a:endParaRPr lang="fr-FR"/>
           </a:p>
@@ -1249,7 +1346,18 @@
   <p:clrMapOvr>
     <a:masterClrMapping/>
   </p:clrMapOvr>
-  <p:hf hdr="0" ftr="0" dt="0"/>
+  <mc:AlternateContent xmlns:mc="http://schemas.openxmlformats.org/markup-compatibility/2006">
+    <mc:Choice xmlns:p14="http://schemas.microsoft.com/office/powerpoint/2010/main" Requires="p14">
+      <p:transition spd="slow" p14:dur="1600">
+        <p14:conveyor dir="l"/>
+      </p:transition>
+    </mc:Choice>
+    <mc:Fallback>
+      <p:transition spd="slow">
+        <p:fade/>
+      </p:transition>
+    </mc:Fallback>
+  </mc:AlternateContent>
 </p:sldLayout>
 </file>
 
@@ -1440,9 +1548,9 @@
           <a:bodyPr/>
           <a:lstStyle/>
           <a:p>
-            <a:fld id="{D5EC52A5-2BC7-4B04-8F96-4B9C05C04B69}" type="datetime1">
-              <a:rPr lang="fr-FR" smtClean="0"/>
-              <a:t>10/02/2015</a:t>
+            <a:fld id="{35D65DB2-354A-493B-A6E1-F461E0665565}" type="datetime1">
+              <a:rPr lang="fr-FR" smtClean="0"/>
+              <a:t>11/02/2015</a:t>
             </a:fld>
             <a:endParaRPr lang="fr-FR"/>
           </a:p>
@@ -1500,7 +1608,18 @@
   <p:clrMapOvr>
     <a:masterClrMapping/>
   </p:clrMapOvr>
-  <p:hf hdr="0" ftr="0" dt="0"/>
+  <mc:AlternateContent xmlns:mc="http://schemas.openxmlformats.org/markup-compatibility/2006">
+    <mc:Choice xmlns:p14="http://schemas.microsoft.com/office/powerpoint/2010/main" Requires="p14">
+      <p:transition spd="slow" p14:dur="1600">
+        <p14:conveyor dir="l"/>
+      </p:transition>
+    </mc:Choice>
+    <mc:Fallback>
+      <p:transition spd="slow">
+        <p:fade/>
+      </p:transition>
+    </mc:Fallback>
+  </mc:AlternateContent>
 </p:sldLayout>
 </file>
 
@@ -1749,9 +1868,9 @@
           <a:bodyPr/>
           <a:lstStyle/>
           <a:p>
-            <a:fld id="{D5EC52A5-2BC7-4B04-8F96-4B9C05C04B69}" type="datetime1">
-              <a:rPr lang="fr-FR" smtClean="0"/>
-              <a:t>10/02/2015</a:t>
+            <a:fld id="{A071098D-04D2-4885-A21A-D49D998BA775}" type="datetime1">
+              <a:rPr lang="fr-FR" smtClean="0"/>
+              <a:t>11/02/2015</a:t>
             </a:fld>
             <a:endParaRPr lang="fr-FR"/>
           </a:p>
@@ -1877,7 +1996,18 @@
   <p:clrMapOvr>
     <a:masterClrMapping/>
   </p:clrMapOvr>
-  <p:hf hdr="0" ftr="0" dt="0"/>
+  <mc:AlternateContent xmlns:mc="http://schemas.openxmlformats.org/markup-compatibility/2006">
+    <mc:Choice xmlns:p14="http://schemas.microsoft.com/office/powerpoint/2010/main" Requires="p14">
+      <p:transition spd="slow" p14:dur="1600">
+        <p14:conveyor dir="l"/>
+      </p:transition>
+    </mc:Choice>
+    <mc:Fallback>
+      <p:transition spd="slow">
+        <p:fade/>
+      </p:transition>
+    </mc:Fallback>
+  </mc:AlternateContent>
 </p:sldLayout>
 </file>
 
@@ -2068,9 +2198,9 @@
           <a:bodyPr/>
           <a:lstStyle/>
           <a:p>
-            <a:fld id="{D5EC52A5-2BC7-4B04-8F96-4B9C05C04B69}" type="datetime1">
-              <a:rPr lang="fr-FR" smtClean="0"/>
-              <a:t>10/02/2015</a:t>
+            <a:fld id="{F8C00819-B40E-4853-9F1F-262F73C99AF1}" type="datetime1">
+              <a:rPr lang="fr-FR" smtClean="0"/>
+              <a:t>11/02/2015</a:t>
             </a:fld>
             <a:endParaRPr lang="fr-FR"/>
           </a:p>
@@ -2128,7 +2258,18 @@
   <p:clrMapOvr>
     <a:masterClrMapping/>
   </p:clrMapOvr>
-  <p:hf hdr="0" ftr="0" dt="0"/>
+  <mc:AlternateContent xmlns:mc="http://schemas.openxmlformats.org/markup-compatibility/2006">
+    <mc:Choice xmlns:p14="http://schemas.microsoft.com/office/powerpoint/2010/main" Requires="p14">
+      <p:transition spd="slow" p14:dur="1600">
+        <p14:conveyor dir="l"/>
+      </p:transition>
+    </mc:Choice>
+    <mc:Fallback>
+      <p:transition spd="slow">
+        <p:fade/>
+      </p:transition>
+    </mc:Fallback>
+  </mc:AlternateContent>
 </p:sldLayout>
 </file>
 
@@ -2371,9 +2512,9 @@
           <a:bodyPr/>
           <a:lstStyle/>
           <a:p>
-            <a:fld id="{D5EC52A5-2BC7-4B04-8F96-4B9C05C04B69}" type="datetime1">
-              <a:rPr lang="fr-FR" smtClean="0"/>
-              <a:t>10/02/2015</a:t>
+            <a:fld id="{CC9FE5C2-6CC9-499F-84DE-27A7FD4863D1}" type="datetime1">
+              <a:rPr lang="fr-FR" smtClean="0"/>
+              <a:t>11/02/2015</a:t>
             </a:fld>
             <a:endParaRPr lang="fr-FR"/>
           </a:p>
@@ -2499,7 +2640,18 @@
   <p:clrMapOvr>
     <a:masterClrMapping/>
   </p:clrMapOvr>
-  <p:hf hdr="0" ftr="0" dt="0"/>
+  <mc:AlternateContent xmlns:mc="http://schemas.openxmlformats.org/markup-compatibility/2006">
+    <mc:Choice xmlns:p14="http://schemas.microsoft.com/office/powerpoint/2010/main" Requires="p14">
+      <p:transition spd="slow" p14:dur="1600">
+        <p14:conveyor dir="l"/>
+      </p:transition>
+    </mc:Choice>
+    <mc:Fallback>
+      <p:transition spd="slow">
+        <p:fade/>
+      </p:transition>
+    </mc:Fallback>
+  </mc:AlternateContent>
 </p:sldLayout>
 </file>
 
@@ -2739,9 +2891,9 @@
           <a:bodyPr/>
           <a:lstStyle/>
           <a:p>
-            <a:fld id="{D5EC52A5-2BC7-4B04-8F96-4B9C05C04B69}" type="datetime1">
-              <a:rPr lang="fr-FR" smtClean="0"/>
-              <a:t>10/02/2015</a:t>
+            <a:fld id="{23F7E991-A522-4537-A420-29535C3469DE}" type="datetime1">
+              <a:rPr lang="fr-FR" smtClean="0"/>
+              <a:t>11/02/2015</a:t>
             </a:fld>
             <a:endParaRPr lang="fr-FR"/>
           </a:p>
@@ -2799,7 +2951,18 @@
   <p:clrMapOvr>
     <a:masterClrMapping/>
   </p:clrMapOvr>
-  <p:hf hdr="0" ftr="0" dt="0"/>
+  <mc:AlternateContent xmlns:mc="http://schemas.openxmlformats.org/markup-compatibility/2006">
+    <mc:Choice xmlns:p14="http://schemas.microsoft.com/office/powerpoint/2010/main" Requires="p14">
+      <p:transition spd="slow" p14:dur="1600">
+        <p14:conveyor dir="l"/>
+      </p:transition>
+    </mc:Choice>
+    <mc:Fallback>
+      <p:transition spd="slow">
+        <p:fade/>
+      </p:transition>
+    </mc:Fallback>
+  </mc:AlternateContent>
 </p:sldLayout>
 </file>
 
@@ -2914,9 +3077,9 @@
           <a:bodyPr/>
           <a:lstStyle/>
           <a:p>
-            <a:fld id="{05449F63-9D70-443D-A858-ECF6A8A64C98}" type="datetime1">
-              <a:rPr lang="fr-FR" smtClean="0"/>
-              <a:t>10/02/2015</a:t>
+            <a:fld id="{C710449A-25A0-443D-A133-6FCB8C71EBEF}" type="datetime1">
+              <a:rPr lang="fr-FR" smtClean="0"/>
+              <a:t>11/02/2015</a:t>
             </a:fld>
             <a:endParaRPr lang="fr-FR"/>
           </a:p>
@@ -2974,6 +3137,18 @@
   <p:clrMapOvr>
     <a:masterClrMapping/>
   </p:clrMapOvr>
+  <mc:AlternateContent xmlns:mc="http://schemas.openxmlformats.org/markup-compatibility/2006">
+    <mc:Choice xmlns:p14="http://schemas.microsoft.com/office/powerpoint/2010/main" Requires="p14">
+      <p:transition spd="slow" p14:dur="1600">
+        <p14:conveyor dir="l"/>
+      </p:transition>
+    </mc:Choice>
+    <mc:Fallback>
+      <p:transition spd="slow">
+        <p:fade/>
+      </p:transition>
+    </mc:Fallback>
+  </mc:AlternateContent>
 </p:sldLayout>
 </file>
 
@@ -3094,9 +3269,9 @@
           <a:bodyPr/>
           <a:lstStyle/>
           <a:p>
-            <a:fld id="{B870569E-8A87-455B-878A-4A97D0B983D8}" type="datetime1">
-              <a:rPr lang="fr-FR" smtClean="0"/>
-              <a:t>10/02/2015</a:t>
+            <a:fld id="{90A2C25E-8A7A-4DE0-AFAE-BEEA5320D0AB}" type="datetime1">
+              <a:rPr lang="fr-FR" smtClean="0"/>
+              <a:t>11/02/2015</a:t>
             </a:fld>
             <a:endParaRPr lang="fr-FR"/>
           </a:p>
@@ -3154,6 +3329,18 @@
   <p:clrMapOvr>
     <a:masterClrMapping/>
   </p:clrMapOvr>
+  <mc:AlternateContent xmlns:mc="http://schemas.openxmlformats.org/markup-compatibility/2006">
+    <mc:Choice xmlns:p14="http://schemas.microsoft.com/office/powerpoint/2010/main" Requires="p14">
+      <p:transition spd="slow" p14:dur="1600">
+        <p14:conveyor dir="l"/>
+      </p:transition>
+    </mc:Choice>
+    <mc:Fallback>
+      <p:transition spd="slow">
+        <p:fade/>
+      </p:transition>
+    </mc:Fallback>
+  </mc:AlternateContent>
 </p:sldLayout>
 </file>
 
@@ -3264,9 +3451,9 @@
           <a:bodyPr/>
           <a:lstStyle/>
           <a:p>
-            <a:fld id="{0DDF9BE0-457D-404A-8197-055C16BB90DA}" type="datetime1">
-              <a:rPr lang="fr-FR" smtClean="0"/>
-              <a:t>10/02/2015</a:t>
+            <a:fld id="{9424332F-7ED6-44D9-9F0F-4E69CCB0E10F}" type="datetime1">
+              <a:rPr lang="fr-FR" smtClean="0"/>
+              <a:t>11/02/2015</a:t>
             </a:fld>
             <a:endParaRPr lang="fr-FR"/>
           </a:p>
@@ -3324,6 +3511,18 @@
   <p:clrMapOvr>
     <a:masterClrMapping/>
   </p:clrMapOvr>
+  <mc:AlternateContent xmlns:mc="http://schemas.openxmlformats.org/markup-compatibility/2006">
+    <mc:Choice xmlns:p14="http://schemas.microsoft.com/office/powerpoint/2010/main" Requires="p14">
+      <p:transition spd="slow" p14:dur="1600">
+        <p14:conveyor dir="l"/>
+      </p:transition>
+    </mc:Choice>
+    <mc:Fallback>
+      <p:transition spd="slow">
+        <p:fade/>
+      </p:transition>
+    </mc:Fallback>
+  </mc:AlternateContent>
 </p:sldLayout>
 </file>
 
@@ -3514,9 +3713,9 @@
           <a:bodyPr/>
           <a:lstStyle/>
           <a:p>
-            <a:fld id="{078DDF4B-7967-4EAF-BEF7-E95F767C5BC3}" type="datetime1">
-              <a:rPr lang="fr-FR" smtClean="0"/>
-              <a:t>10/02/2015</a:t>
+            <a:fld id="{B09DE48F-1F4B-4121-BD44-532720BF51B6}" type="datetime1">
+              <a:rPr lang="fr-FR" smtClean="0"/>
+              <a:t>11/02/2015</a:t>
             </a:fld>
             <a:endParaRPr lang="fr-FR"/>
           </a:p>
@@ -3574,6 +3773,18 @@
   <p:clrMapOvr>
     <a:masterClrMapping/>
   </p:clrMapOvr>
+  <mc:AlternateContent xmlns:mc="http://schemas.openxmlformats.org/markup-compatibility/2006">
+    <mc:Choice xmlns:p14="http://schemas.microsoft.com/office/powerpoint/2010/main" Requires="p14">
+      <p:transition spd="slow" p14:dur="1600">
+        <p14:conveyor dir="l"/>
+      </p:transition>
+    </mc:Choice>
+    <mc:Fallback>
+      <p:transition spd="slow">
+        <p:fade/>
+      </p:transition>
+    </mc:Fallback>
+  </mc:AlternateContent>
 </p:sldLayout>
 </file>
 
@@ -3750,9 +3961,9 @@
           <a:bodyPr/>
           <a:lstStyle/>
           <a:p>
-            <a:fld id="{68D84FAF-1B6F-42CD-8168-14D50349D69D}" type="datetime1">
-              <a:rPr lang="fr-FR" smtClean="0"/>
-              <a:t>10/02/2015</a:t>
+            <a:fld id="{F75AAF0E-1AFE-4762-B21F-67260258D69A}" type="datetime1">
+              <a:rPr lang="fr-FR" smtClean="0"/>
+              <a:t>11/02/2015</a:t>
             </a:fld>
             <a:endParaRPr lang="fr-FR"/>
           </a:p>
@@ -3810,6 +4021,18 @@
   <p:clrMapOvr>
     <a:masterClrMapping/>
   </p:clrMapOvr>
+  <mc:AlternateContent xmlns:mc="http://schemas.openxmlformats.org/markup-compatibility/2006">
+    <mc:Choice xmlns:p14="http://schemas.microsoft.com/office/powerpoint/2010/main" Requires="p14">
+      <p:transition spd="slow" p14:dur="1600">
+        <p14:conveyor dir="l"/>
+      </p:transition>
+    </mc:Choice>
+    <mc:Fallback>
+      <p:transition spd="slow">
+        <p:fade/>
+      </p:transition>
+    </mc:Fallback>
+  </mc:AlternateContent>
 </p:sldLayout>
 </file>
 
@@ -4132,9 +4355,9 @@
           <a:bodyPr/>
           <a:lstStyle/>
           <a:p>
-            <a:fld id="{FA188665-9482-4D8E-8FFE-1C6B3B8AFF7B}" type="datetime1">
-              <a:rPr lang="fr-FR" smtClean="0"/>
-              <a:t>10/02/2015</a:t>
+            <a:fld id="{0D17906F-A6D1-482A-BEDF-7064F738416A}" type="datetime1">
+              <a:rPr lang="fr-FR" smtClean="0"/>
+              <a:t>11/02/2015</a:t>
             </a:fld>
             <a:endParaRPr lang="fr-FR"/>
           </a:p>
@@ -4192,6 +4415,18 @@
   <p:clrMapOvr>
     <a:masterClrMapping/>
   </p:clrMapOvr>
+  <mc:AlternateContent xmlns:mc="http://schemas.openxmlformats.org/markup-compatibility/2006">
+    <mc:Choice xmlns:p14="http://schemas.microsoft.com/office/powerpoint/2010/main" Requires="p14">
+      <p:transition spd="slow" p14:dur="1600">
+        <p14:conveyor dir="l"/>
+      </p:transition>
+    </mc:Choice>
+    <mc:Fallback>
+      <p:transition spd="slow">
+        <p:fade/>
+      </p:transition>
+    </mc:Fallback>
+  </mc:AlternateContent>
 </p:sldLayout>
 </file>
 
@@ -4250,9 +4485,9 @@
           <a:bodyPr/>
           <a:lstStyle/>
           <a:p>
-            <a:fld id="{4D9BB87C-AA0C-4399-894C-82C60C5B11CD}" type="datetime1">
-              <a:rPr lang="fr-FR" smtClean="0"/>
-              <a:t>10/02/2015</a:t>
+            <a:fld id="{8E8B85BC-9CFA-42B2-935D-1A253C773748}" type="datetime1">
+              <a:rPr lang="fr-FR" smtClean="0"/>
+              <a:t>11/02/2015</a:t>
             </a:fld>
             <a:endParaRPr lang="fr-FR"/>
           </a:p>
@@ -4310,6 +4545,18 @@
   <p:clrMapOvr>
     <a:masterClrMapping/>
   </p:clrMapOvr>
+  <mc:AlternateContent xmlns:mc="http://schemas.openxmlformats.org/markup-compatibility/2006">
+    <mc:Choice xmlns:p14="http://schemas.microsoft.com/office/powerpoint/2010/main" Requires="p14">
+      <p:transition spd="slow" p14:dur="1600">
+        <p14:conveyor dir="l"/>
+      </p:transition>
+    </mc:Choice>
+    <mc:Fallback>
+      <p:transition spd="slow">
+        <p:fade/>
+      </p:transition>
+    </mc:Fallback>
+  </mc:AlternateContent>
 </p:sldLayout>
 </file>
 
@@ -4345,9 +4592,9 @@
           <a:bodyPr/>
           <a:lstStyle/>
           <a:p>
-            <a:fld id="{539EBB13-615C-4749-B2AA-1C8B28263644}" type="datetime1">
-              <a:rPr lang="fr-FR" smtClean="0"/>
-              <a:t>10/02/2015</a:t>
+            <a:fld id="{093FF155-F53E-47DC-8CA4-44255218F186}" type="datetime1">
+              <a:rPr lang="fr-FR" smtClean="0"/>
+              <a:t>11/02/2015</a:t>
             </a:fld>
             <a:endParaRPr lang="fr-FR"/>
           </a:p>
@@ -4405,6 +4652,18 @@
   <p:clrMapOvr>
     <a:masterClrMapping/>
   </p:clrMapOvr>
+  <mc:AlternateContent xmlns:mc="http://schemas.openxmlformats.org/markup-compatibility/2006">
+    <mc:Choice xmlns:p14="http://schemas.microsoft.com/office/powerpoint/2010/main" Requires="p14">
+      <p:transition spd="slow" p14:dur="1600">
+        <p14:conveyor dir="l"/>
+      </p:transition>
+    </mc:Choice>
+    <mc:Fallback>
+      <p:transition spd="slow">
+        <p:fade/>
+      </p:transition>
+    </mc:Fallback>
+  </mc:AlternateContent>
 </p:sldLayout>
 </file>
 
@@ -4600,9 +4859,9 @@
           <a:bodyPr/>
           <a:lstStyle/>
           <a:p>
-            <a:fld id="{B55E8AF4-1AE1-42D4-A6E0-7BFB8E70E5D7}" type="datetime1">
-              <a:rPr lang="fr-FR" smtClean="0"/>
-              <a:t>10/02/2015</a:t>
+            <a:fld id="{99C7B337-5E8B-4D6B-A19D-222CF5CEE7A2}" type="datetime1">
+              <a:rPr lang="fr-FR" smtClean="0"/>
+              <a:t>11/02/2015</a:t>
             </a:fld>
             <a:endParaRPr lang="fr-FR"/>
           </a:p>
@@ -4660,6 +4919,18 @@
   <p:clrMapOvr>
     <a:masterClrMapping/>
   </p:clrMapOvr>
+  <mc:AlternateContent xmlns:mc="http://schemas.openxmlformats.org/markup-compatibility/2006">
+    <mc:Choice xmlns:p14="http://schemas.microsoft.com/office/powerpoint/2010/main" Requires="p14">
+      <p:transition spd="slow" p14:dur="1600">
+        <p14:conveyor dir="l"/>
+      </p:transition>
+    </mc:Choice>
+    <mc:Fallback>
+      <p:transition spd="slow">
+        <p:fade/>
+      </p:transition>
+    </mc:Fallback>
+  </mc:AlternateContent>
 </p:sldLayout>
 </file>
 
@@ -4883,9 +5154,9 @@
           <a:bodyPr/>
           <a:lstStyle/>
           <a:p>
-            <a:fld id="{C8C4A357-E863-4BA8-AA63-F0145CFDC296}" type="datetime1">
-              <a:rPr lang="fr-FR" smtClean="0"/>
-              <a:t>10/02/2015</a:t>
+            <a:fld id="{F39C9738-89A8-4B5A-9688-070DC3BFC88D}" type="datetime1">
+              <a:rPr lang="fr-FR" smtClean="0"/>
+              <a:t>11/02/2015</a:t>
             </a:fld>
             <a:endParaRPr lang="fr-FR"/>
           </a:p>
@@ -4943,6 +5214,18 @@
   <p:clrMapOvr>
     <a:masterClrMapping/>
   </p:clrMapOvr>
+  <mc:AlternateContent xmlns:mc="http://schemas.openxmlformats.org/markup-compatibility/2006">
+    <mc:Choice xmlns:p14="http://schemas.microsoft.com/office/powerpoint/2010/main" Requires="p14">
+      <p:transition spd="slow" p14:dur="1600">
+        <p14:conveyor dir="l"/>
+      </p:transition>
+    </mc:Choice>
+    <mc:Fallback>
+      <p:transition spd="slow">
+        <p:fade/>
+      </p:transition>
+    </mc:Fallback>
+  </mc:AlternateContent>
 </p:sldLayout>
 </file>
 
@@ -5289,9 +5572,9 @@
             </a:lvl1pPr>
           </a:lstStyle>
           <a:p>
-            <a:fld id="{D5EC52A5-2BC7-4B04-8F96-4B9C05C04B69}" type="datetime1">
-              <a:rPr lang="fr-FR" smtClean="0"/>
-              <a:t>10/02/2015</a:t>
+            <a:fld id="{53C6C397-315B-4897-8EA7-1F6E63C439F3}" type="datetime1">
+              <a:rPr lang="fr-FR" smtClean="0"/>
+              <a:t>11/02/2015</a:t>
             </a:fld>
             <a:endParaRPr lang="fr-FR"/>
           </a:p>
@@ -5406,6 +5689,18 @@
     <p:sldLayoutId id="2147484372" r:id="rId16"/>
     <p:sldLayoutId id="2147484373" r:id="rId17"/>
   </p:sldLayoutIdLst>
+  <mc:AlternateContent xmlns:mc="http://schemas.openxmlformats.org/markup-compatibility/2006">
+    <mc:Choice xmlns:p14="http://schemas.microsoft.com/office/powerpoint/2010/main" Requires="p14">
+      <p:transition spd="slow" p14:dur="1600">
+        <p14:conveyor dir="l"/>
+      </p:transition>
+    </mc:Choice>
+    <mc:Fallback>
+      <p:transition spd="slow">
+        <p:fade/>
+      </p:transition>
+    </mc:Fallback>
+  </mc:AlternateContent>
   <p:hf hdr="0" ftr="0" dt="0"/>
   <p:txStyles>
     <p:titleStyle>
@@ -5851,55 +6146,56 @@
           <a:p>
             <a:pPr algn="ctr"/>
             <a:r>
-              <a:rPr lang="fr-FR" dirty="0" smtClean="0"/>
+              <a:rPr lang="fr-FR" dirty="0" smtClean="0">
+                <a:solidFill>
+                  <a:schemeClr val="bg1"/>
+                </a:solidFill>
+              </a:rPr>
               <a:t>By</a:t>
             </a:r>
           </a:p>
           <a:p>
             <a:pPr algn="ctr"/>
             <a:r>
-              <a:rPr lang="fr-FR" dirty="0" smtClean="0"/>
+              <a:rPr lang="fr-FR" dirty="0" smtClean="0">
+                <a:solidFill>
+                  <a:schemeClr val="bg1"/>
+                </a:solidFill>
+              </a:rPr>
               <a:t>Alexis Barny</a:t>
             </a:r>
           </a:p>
           <a:p>
             <a:pPr algn="ctr"/>
             <a:r>
-              <a:rPr lang="fr-FR" dirty="0" smtClean="0"/>
+              <a:rPr lang="fr-FR" dirty="0" smtClean="0">
+                <a:solidFill>
+                  <a:schemeClr val="bg1"/>
+                </a:solidFill>
+              </a:rPr>
               <a:t>Pierre Eveno</a:t>
             </a:r>
-            <a:endParaRPr lang="fr-FR" dirty="0"/>
+            <a:endParaRPr lang="fr-FR" dirty="0">
+              <a:solidFill>
+                <a:schemeClr val="bg1"/>
+              </a:solidFill>
+            </a:endParaRPr>
           </a:p>
           <a:p>
             <a:pPr algn="ctr"/>
             <a:r>
-              <a:rPr lang="fr-FR" dirty="0" smtClean="0"/>
+              <a:rPr lang="fr-FR" dirty="0" smtClean="0">
+                <a:solidFill>
+                  <a:schemeClr val="bg1"/>
+                </a:solidFill>
+              </a:rPr>
               <a:t>Hadrien Tran</a:t>
             </a:r>
-            <a:endParaRPr lang="fr-FR" dirty="0"/>
-          </a:p>
-        </p:txBody>
-      </p:sp>
-      <p:sp>
-        <p:nvSpPr>
-          <p:cNvPr id="6" name="Espace réservé du numéro de diapositive 5"/>
-          <p:cNvSpPr>
-            <a:spLocks noGrp="1"/>
-          </p:cNvSpPr>
-          <p:nvPr>
-            <p:ph type="sldNum" sz="quarter" idx="12"/>
-          </p:nvPr>
-        </p:nvSpPr>
-        <p:spPr/>
-        <p:txBody>
-          <a:bodyPr/>
-          <a:lstStyle/>
-          <a:p>
-            <a:fld id="{329D2A3D-7777-43B9-862C-AF2C35877681}" type="slidenum">
-              <a:rPr lang="fr-FR" smtClean="0"/>
-              <a:t>1</a:t>
-            </a:fld>
-            <a:endParaRPr lang="fr-FR"/>
+            <a:endParaRPr lang="fr-FR" dirty="0">
+              <a:solidFill>
+                <a:schemeClr val="bg1"/>
+              </a:solidFill>
+            </a:endParaRPr>
           </a:p>
         </p:txBody>
       </p:sp>
@@ -5912,7 +6208,7 @@
           <p:nvPr/>
         </p:nvPicPr>
         <p:blipFill>
-          <a:blip r:embed="rId2">
+          <a:blip r:embed="rId3">
             <a:extLst>
               <a:ext uri="{28A0092B-C50C-407E-A947-70E740481C1C}">
                 <a14:useLocalDpi xmlns:a14="http://schemas.microsoft.com/office/drawing/2010/main" val="0"/>
@@ -5972,7 +6268,7 @@
         <p:spPr>
           <a:xfrm>
             <a:off x="335459" y="212035"/>
-            <a:ext cx="3692604" cy="1200329"/>
+            <a:ext cx="3692604" cy="1661993"/>
           </a:xfrm>
           <a:prstGeom prst="rect">
             <a:avLst/>
@@ -5987,22 +6283,22 @@
           <a:p>
             <a:pPr lvl="0"/>
             <a:r>
-              <a:rPr lang="en-US" dirty="0" smtClean="0"/>
+              <a:rPr lang="en-US" sz="2800" dirty="0" smtClean="0"/>
               <a:t>Topic 13: </a:t>
             </a:r>
           </a:p>
           <a:p>
             <a:pPr lvl="0"/>
             <a:r>
-              <a:rPr lang="fr-FR" altLang="fr-FR" dirty="0" err="1" smtClean="0"/>
+              <a:rPr lang="en-US" altLang="fr-FR" sz="2800" dirty="0" smtClean="0"/>
               <a:t>Task</a:t>
             </a:r>
             <a:r>
-              <a:rPr lang="fr-FR" altLang="fr-FR" dirty="0" smtClean="0"/>
+              <a:rPr lang="fr-FR" altLang="fr-FR" sz="2800" dirty="0" smtClean="0"/>
               <a:t> </a:t>
             </a:r>
             <a:r>
-              <a:rPr lang="fr-FR" altLang="fr-FR" dirty="0"/>
+              <a:rPr lang="fr-FR" altLang="fr-FR" sz="2800" dirty="0"/>
               <a:t>management web application </a:t>
             </a:r>
           </a:p>
@@ -6099,6 +6395,36 @@
           </a:p>
         </p:txBody>
       </p:sp>
+      <p:pic>
+        <p:nvPicPr>
+          <p:cNvPr id="6" name="Image 5"/>
+          <p:cNvPicPr>
+            <a:picLocks noChangeAspect="1"/>
+          </p:cNvPicPr>
+          <p:nvPr/>
+        </p:nvPicPr>
+        <p:blipFill>
+          <a:blip r:embed="rId4">
+            <a:extLst>
+              <a:ext uri="{28A0092B-C50C-407E-A947-70E740481C1C}">
+                <a14:useLocalDpi xmlns:a14="http://schemas.microsoft.com/office/drawing/2010/main" val="0"/>
+              </a:ext>
+            </a:extLst>
+          </a:blip>
+          <a:stretch>
+            <a:fillRect/>
+          </a:stretch>
+        </p:blipFill>
+        <p:spPr>
+          <a:xfrm>
+            <a:off x="9531627" y="4496095"/>
+            <a:ext cx="2552381" cy="2361905"/>
+          </a:xfrm>
+          <a:prstGeom prst="rect">
+            <a:avLst/>
+          </a:prstGeom>
+        </p:spPr>
+      </p:pic>
     </p:spTree>
     <p:extLst>
       <p:ext uri="{BB962C8B-B14F-4D97-AF65-F5344CB8AC3E}">
@@ -6109,6 +6435,18 @@
   <p:clrMapOvr>
     <a:masterClrMapping/>
   </p:clrMapOvr>
+  <mc:AlternateContent xmlns:mc="http://schemas.openxmlformats.org/markup-compatibility/2006">
+    <mc:Choice xmlns:p14="http://schemas.microsoft.com/office/powerpoint/2010/main" Requires="p14">
+      <p:transition spd="slow" p14:dur="2000">
+        <p14:ferris dir="l"/>
+      </p:transition>
+    </mc:Choice>
+    <mc:Fallback>
+      <p:transition spd="slow">
+        <p:fade/>
+      </p:transition>
+    </mc:Fallback>
+  </mc:AlternateContent>
   <p:timing>
     <p:tnLst>
       <p:par>
@@ -6138,6 +6476,49 @@
       </p:grpSpPr>
       <p:sp>
         <p:nvSpPr>
+          <p:cNvPr id="15" name="Rectangle à coins arrondis 14"/>
+          <p:cNvSpPr/>
+          <p:nvPr/>
+        </p:nvSpPr>
+        <p:spPr>
+          <a:xfrm>
+            <a:off x="8674100" y="2269120"/>
+            <a:ext cx="1930400" cy="1460500"/>
+          </a:xfrm>
+          <a:prstGeom prst="roundRect">
+            <a:avLst/>
+          </a:prstGeom>
+          <a:solidFill>
+            <a:srgbClr val="CD5C5C"/>
+          </a:solidFill>
+        </p:spPr>
+        <p:style>
+          <a:lnRef idx="2">
+            <a:schemeClr val="accent1">
+              <a:shade val="50000"/>
+            </a:schemeClr>
+          </a:lnRef>
+          <a:fillRef idx="1">
+            <a:schemeClr val="accent1"/>
+          </a:fillRef>
+          <a:effectRef idx="0">
+            <a:schemeClr val="accent1"/>
+          </a:effectRef>
+          <a:fontRef idx="minor">
+            <a:schemeClr val="lt1"/>
+          </a:fontRef>
+        </p:style>
+        <p:txBody>
+          <a:bodyPr rtlCol="0" anchor="ctr"/>
+          <a:lstStyle/>
+          <a:p>
+            <a:pPr algn="ctr"/>
+            <a:endParaRPr lang="en-US"/>
+          </a:p>
+        </p:txBody>
+      </p:sp>
+      <p:sp>
+        <p:nvSpPr>
           <p:cNvPr id="2" name="Titre 1"/>
           <p:cNvSpPr>
             <a:spLocks noGrp="1"/>
@@ -6148,8 +6529,8 @@
         </p:nvSpPr>
         <p:spPr>
           <a:xfrm>
-            <a:off x="1458912" y="685800"/>
-            <a:ext cx="8534400" cy="1507067"/>
+            <a:off x="0" y="0"/>
+            <a:ext cx="12192000" cy="1507067"/>
           </a:xfrm>
         </p:spPr>
         <p:txBody>
@@ -6158,20 +6539,8 @@
           <a:p>
             <a:pPr algn="ctr"/>
             <a:r>
-              <a:rPr lang="en-US" dirty="0" smtClean="0"/>
-              <a:t>La </a:t>
-            </a:r>
-            <a:r>
-              <a:rPr lang="en-US" dirty="0" err="1" smtClean="0"/>
-              <a:t>gestion</a:t>
-            </a:r>
-            <a:r>
-              <a:rPr lang="en-US" dirty="0" smtClean="0"/>
-              <a:t> des </a:t>
-            </a:r>
-            <a:r>
-              <a:rPr lang="en-US" dirty="0" err="1" smtClean="0"/>
-              <a:t>tâches</a:t>
+              <a:rPr lang="en-US" dirty="0"/>
+              <a:t>creating tasks</a:t>
             </a:r>
             <a:endParaRPr lang="en-US" dirty="0"/>
           </a:p>
@@ -6197,6 +6566,77 @@
               <a:t>10</a:t>
             </a:fld>
             <a:endParaRPr lang="fr-FR"/>
+          </a:p>
+        </p:txBody>
+      </p:sp>
+      <p:pic>
+        <p:nvPicPr>
+          <p:cNvPr id="6" name="Image 5"/>
+          <p:cNvPicPr>
+            <a:picLocks noChangeAspect="1"/>
+          </p:cNvPicPr>
+          <p:nvPr/>
+        </p:nvPicPr>
+        <p:blipFill>
+          <a:blip r:embed="rId2">
+            <a:extLst>
+              <a:ext uri="{28A0092B-C50C-407E-A947-70E740481C1C}">
+                <a14:useLocalDpi xmlns:a14="http://schemas.microsoft.com/office/drawing/2010/main" val="0"/>
+              </a:ext>
+            </a:extLst>
+          </a:blip>
+          <a:stretch>
+            <a:fillRect/>
+          </a:stretch>
+        </p:blipFill>
+        <p:spPr>
+          <a:xfrm>
+            <a:off x="10173376" y="317398"/>
+            <a:ext cx="1713838" cy="1497955"/>
+          </a:xfrm>
+          <a:prstGeom prst="rect">
+            <a:avLst/>
+          </a:prstGeom>
+        </p:spPr>
+      </p:pic>
+      <p:sp>
+        <p:nvSpPr>
+          <p:cNvPr id="9" name="ZoneTexte 8"/>
+          <p:cNvSpPr txBox="1"/>
+          <p:nvPr/>
+        </p:nvSpPr>
+        <p:spPr>
+          <a:xfrm>
+            <a:off x="842829" y="5184720"/>
+            <a:ext cx="6830358" cy="646331"/>
+          </a:xfrm>
+          <a:prstGeom prst="rect">
+            <a:avLst/>
+          </a:prstGeom>
+          <a:noFill/>
+        </p:spPr>
+        <p:txBody>
+          <a:bodyPr wrap="square" rtlCol="0">
+            <a:spAutoFit/>
+          </a:bodyPr>
+          <a:lstStyle/>
+          <a:p>
+            <a:r>
+              <a:rPr lang="en-US" dirty="0" smtClean="0"/>
+              <a:t>Once </a:t>
+            </a:r>
+            <a:r>
+              <a:rPr lang="en-US" dirty="0"/>
+              <a:t>validated, the task is recorded </a:t>
+            </a:r>
+            <a:r>
+              <a:rPr lang="en-US" dirty="0" smtClean="0"/>
+              <a:t>in the database </a:t>
+            </a:r>
+            <a:r>
+              <a:rPr lang="en-US" dirty="0"/>
+              <a:t>and will be posted on the calendar.</a:t>
+            </a:r>
           </a:p>
         </p:txBody>
       </p:sp>
@@ -6209,30 +6649,149 @@
           <p:nvPr/>
         </p:nvPicPr>
         <p:blipFill rotWithShape="1">
-          <a:blip r:embed="rId2"/>
-          <a:srcRect l="4388" t="11214" r="3113" b="6801"/>
+          <a:blip r:embed="rId3">
+            <a:extLst>
+              <a:ext uri="{28A0092B-C50C-407E-A947-70E740481C1C}">
+                <a14:useLocalDpi xmlns:a14="http://schemas.microsoft.com/office/drawing/2010/main" val="0"/>
+              </a:ext>
+            </a:extLst>
+          </a:blip>
+          <a:srcRect l="4420" t="12996" r="3283" b="6156"/>
           <a:stretch/>
         </p:blipFill>
         <p:spPr>
           <a:xfrm>
-            <a:off x="2982911" y="1801905"/>
-            <a:ext cx="5486401" cy="2734005"/>
+            <a:off x="539751" y="1260051"/>
+            <a:ext cx="7653466" cy="3769150"/>
           </a:xfrm>
           <a:prstGeom prst="rect">
             <a:avLst/>
           </a:prstGeom>
         </p:spPr>
       </p:pic>
+      <p:sp>
+        <p:nvSpPr>
+          <p:cNvPr id="5" name="ZoneTexte 4"/>
+          <p:cNvSpPr txBox="1"/>
+          <p:nvPr/>
+        </p:nvSpPr>
+        <p:spPr>
+          <a:xfrm>
+            <a:off x="8732968" y="2474490"/>
+            <a:ext cx="2082800" cy="1477328"/>
+          </a:xfrm>
+          <a:prstGeom prst="rect">
+            <a:avLst/>
+          </a:prstGeom>
+          <a:noFill/>
+        </p:spPr>
+        <p:txBody>
+          <a:bodyPr wrap="square" rtlCol="0">
+            <a:spAutoFit/>
+          </a:bodyPr>
+          <a:lstStyle/>
+          <a:p>
+            <a:r>
+              <a:rPr lang="en-US" dirty="0" smtClean="0"/>
+              <a:t>Required fields:</a:t>
+            </a:r>
+          </a:p>
+          <a:p>
+            <a:pPr marL="285750" indent="-285750">
+              <a:buFontTx/>
+              <a:buChar char="-"/>
+            </a:pPr>
+            <a:r>
+              <a:rPr lang="en-US" dirty="0" smtClean="0"/>
+              <a:t>called </a:t>
+            </a:r>
+          </a:p>
+          <a:p>
+            <a:pPr marL="285750" indent="-285750">
+              <a:buFontTx/>
+              <a:buChar char="-"/>
+            </a:pPr>
+            <a:r>
+              <a:rPr lang="en-US" dirty="0" smtClean="0"/>
+              <a:t>start date </a:t>
+            </a:r>
+          </a:p>
+          <a:p>
+            <a:pPr marL="285750" indent="-285750">
+              <a:buFontTx/>
+              <a:buChar char="-"/>
+            </a:pPr>
+            <a:r>
+              <a:rPr lang="en-US" dirty="0" smtClean="0"/>
+              <a:t>end date</a:t>
+            </a:r>
+            <a:endParaRPr lang="en-US" dirty="0"/>
+          </a:p>
+          <a:p>
+            <a:endParaRPr lang="en-US" dirty="0"/>
+          </a:p>
+        </p:txBody>
+      </p:sp>
+      <p:cxnSp>
+        <p:nvCxnSpPr>
+          <p:cNvPr id="12" name="Connecteur droit avec flèche 11"/>
+          <p:cNvCxnSpPr/>
+          <p:nvPr/>
+        </p:nvCxnSpPr>
+        <p:spPr>
+          <a:xfrm flipH="1">
+            <a:off x="5542451" y="3213154"/>
+            <a:ext cx="2920381" cy="858678"/>
+          </a:xfrm>
+          <a:prstGeom prst="straightConnector1">
+            <a:avLst/>
+          </a:prstGeom>
+          <a:ln w="57150">
+            <a:solidFill>
+              <a:schemeClr val="bg1">
+                <a:alpha val="60000"/>
+              </a:schemeClr>
+            </a:solidFill>
+            <a:tailEnd type="triangle"/>
+          </a:ln>
+        </p:spPr>
+        <p:style>
+          <a:lnRef idx="1">
+            <a:schemeClr val="accent1"/>
+          </a:lnRef>
+          <a:fillRef idx="0">
+            <a:schemeClr val="accent1"/>
+          </a:fillRef>
+          <a:effectRef idx="0">
+            <a:schemeClr val="accent1"/>
+          </a:effectRef>
+          <a:fontRef idx="minor">
+            <a:schemeClr val="tx1"/>
+          </a:fontRef>
+        </p:style>
+      </p:cxnSp>
     </p:spTree>
     <p:extLst>
       <p:ext uri="{BB962C8B-B14F-4D97-AF65-F5344CB8AC3E}">
-        <p14:creationId xmlns:p14="http://schemas.microsoft.com/office/powerpoint/2010/main" val="2648625771"/>
+        <p14:creationId xmlns:p14="http://schemas.microsoft.com/office/powerpoint/2010/main" val="3618906899"/>
       </p:ext>
     </p:extLst>
   </p:cSld>
   <p:clrMapOvr>
     <a:masterClrMapping/>
   </p:clrMapOvr>
+  <mc:AlternateContent xmlns:mc="http://schemas.openxmlformats.org/markup-compatibility/2006">
+    <mc:Choice xmlns:p14="http://schemas.microsoft.com/office/powerpoint/2010/main" Requires="p14">
+      <p:transition spd="slow" p14:dur="1500">
+        <p14:window dir="vert"/>
+      </p:transition>
+    </mc:Choice>
+    <mc:Fallback>
+      <p:transition spd="slow">
+        <p:fade/>
+      </p:transition>
+    </mc:Fallback>
+  </mc:AlternateContent>
   <p:timing>
     <p:tnLst>
       <p:par>
@@ -6272,8 +6831,8 @@
         </p:nvSpPr>
         <p:spPr>
           <a:xfrm>
-            <a:off x="1458912" y="685800"/>
-            <a:ext cx="8534400" cy="1507067"/>
+            <a:off x="0" y="0"/>
+            <a:ext cx="12192000" cy="1507067"/>
           </a:xfrm>
         </p:spPr>
         <p:txBody>
@@ -6282,24 +6841,8 @@
           <a:p>
             <a:pPr algn="ctr"/>
             <a:r>
-              <a:rPr lang="en-US" dirty="0" smtClean="0"/>
-              <a:t>La </a:t>
-            </a:r>
-            <a:r>
-              <a:rPr lang="en-US" dirty="0" err="1" smtClean="0"/>
-              <a:t>gestion</a:t>
-            </a:r>
-            <a:r>
-              <a:rPr lang="en-US" dirty="0" smtClean="0"/>
-              <a:t> </a:t>
-            </a:r>
-            <a:r>
-              <a:rPr lang="en-US" dirty="0" smtClean="0"/>
-              <a:t>de </a:t>
-            </a:r>
-            <a:r>
-              <a:rPr lang="en-US" dirty="0" err="1" smtClean="0"/>
-              <a:t>compte</a:t>
+              <a:rPr lang="en-US" dirty="0"/>
+              <a:t>Account management</a:t>
             </a:r>
             <a:endParaRPr lang="en-US" dirty="0"/>
           </a:p>
@@ -6349,14 +6892,78 @@
         </p:blipFill>
         <p:spPr>
           <a:xfrm>
-            <a:off x="3000842" y="1855694"/>
-            <a:ext cx="5484253" cy="2634564"/>
+            <a:off x="2416641" y="1507067"/>
+            <a:ext cx="6982048" cy="3354085"/>
           </a:xfrm>
           <a:prstGeom prst="rect">
             <a:avLst/>
           </a:prstGeom>
         </p:spPr>
       </p:pic>
+      <p:pic>
+        <p:nvPicPr>
+          <p:cNvPr id="7" name="Image 6"/>
+          <p:cNvPicPr>
+            <a:picLocks noChangeAspect="1"/>
+          </p:cNvPicPr>
+          <p:nvPr/>
+        </p:nvPicPr>
+        <p:blipFill>
+          <a:blip r:embed="rId3">
+            <a:extLst>
+              <a:ext uri="{28A0092B-C50C-407E-A947-70E740481C1C}">
+                <a14:useLocalDpi xmlns:a14="http://schemas.microsoft.com/office/drawing/2010/main" val="0"/>
+              </a:ext>
+            </a:extLst>
+          </a:blip>
+          <a:stretch>
+            <a:fillRect/>
+          </a:stretch>
+        </p:blipFill>
+        <p:spPr>
+          <a:xfrm>
+            <a:off x="10173376" y="317398"/>
+            <a:ext cx="1713838" cy="1497955"/>
+          </a:xfrm>
+          <a:prstGeom prst="rect">
+            <a:avLst/>
+          </a:prstGeom>
+        </p:spPr>
+      </p:pic>
+      <p:sp>
+        <p:nvSpPr>
+          <p:cNvPr id="3" name="ZoneTexte 2"/>
+          <p:cNvSpPr txBox="1"/>
+          <p:nvPr/>
+        </p:nvSpPr>
+        <p:spPr>
+          <a:xfrm>
+            <a:off x="3472702" y="4932144"/>
+            <a:ext cx="5246595" cy="646331"/>
+          </a:xfrm>
+          <a:prstGeom prst="rect">
+            <a:avLst/>
+          </a:prstGeom>
+          <a:noFill/>
+        </p:spPr>
+        <p:txBody>
+          <a:bodyPr wrap="square" rtlCol="0">
+            <a:spAutoFit/>
+          </a:bodyPr>
+          <a:lstStyle/>
+          <a:p>
+            <a:r>
+              <a:rPr lang="en-US" dirty="0"/>
+              <a:t>Account management allows a user to change himself his account </a:t>
+            </a:r>
+            <a:r>
+              <a:rPr lang="en-US" dirty="0" smtClean="0"/>
+              <a:t>information.</a:t>
+            </a:r>
+            <a:endParaRPr lang="en-US" dirty="0"/>
+          </a:p>
+        </p:txBody>
+      </p:sp>
     </p:spTree>
     <p:extLst>
       <p:ext uri="{BB962C8B-B14F-4D97-AF65-F5344CB8AC3E}">
@@ -6367,6 +6974,18 @@
   <p:clrMapOvr>
     <a:masterClrMapping/>
   </p:clrMapOvr>
+  <mc:AlternateContent xmlns:mc="http://schemas.openxmlformats.org/markup-compatibility/2006">
+    <mc:Choice xmlns:p14="http://schemas.microsoft.com/office/powerpoint/2010/main" Requires="p14">
+      <p:transition spd="slow" p14:dur="1600">
+        <p14:conveyor dir="l"/>
+      </p:transition>
+    </mc:Choice>
+    <mc:Fallback>
+      <p:transition spd="slow">
+        <p:fade/>
+      </p:transition>
+    </mc:Fallback>
+  </mc:AlternateContent>
   <p:timing>
     <p:tnLst>
       <p:par>
@@ -6417,7 +7036,11 @@
             <a:pPr algn="ctr"/>
             <a:r>
               <a:rPr lang="fr-FR" dirty="0" smtClean="0"/>
-              <a:t>L’inscription à une tâche</a:t>
+              <a:t>Registration for a </a:t>
+            </a:r>
+            <a:r>
+              <a:rPr lang="fr-FR" dirty="0" err="1" smtClean="0"/>
+              <a:t>task</a:t>
             </a:r>
             <a:endParaRPr lang="fr-FR" dirty="0"/>
           </a:p>
@@ -6470,6 +7093,36 @@
           </a:p>
         </p:txBody>
       </p:sp>
+      <p:pic>
+        <p:nvPicPr>
+          <p:cNvPr id="6" name="Image 5"/>
+          <p:cNvPicPr>
+            <a:picLocks noChangeAspect="1"/>
+          </p:cNvPicPr>
+          <p:nvPr/>
+        </p:nvPicPr>
+        <p:blipFill>
+          <a:blip r:embed="rId2">
+            <a:extLst>
+              <a:ext uri="{28A0092B-C50C-407E-A947-70E740481C1C}">
+                <a14:useLocalDpi xmlns:a14="http://schemas.microsoft.com/office/drawing/2010/main" val="0"/>
+              </a:ext>
+            </a:extLst>
+          </a:blip>
+          <a:stretch>
+            <a:fillRect/>
+          </a:stretch>
+        </p:blipFill>
+        <p:spPr>
+          <a:xfrm>
+            <a:off x="10173376" y="317398"/>
+            <a:ext cx="1713838" cy="1497955"/>
+          </a:xfrm>
+          <a:prstGeom prst="rect">
+            <a:avLst/>
+          </a:prstGeom>
+        </p:spPr>
+      </p:pic>
     </p:spTree>
     <p:extLst>
       <p:ext uri="{BB962C8B-B14F-4D97-AF65-F5344CB8AC3E}">
@@ -6480,6 +7133,18 @@
   <p:clrMapOvr>
     <a:masterClrMapping/>
   </p:clrMapOvr>
+  <mc:AlternateContent xmlns:mc="http://schemas.openxmlformats.org/markup-compatibility/2006">
+    <mc:Choice xmlns:p14="http://schemas.microsoft.com/office/powerpoint/2010/main" Requires="p14">
+      <p:transition spd="slow" p14:dur="1300">
+        <p14:pan dir="u"/>
+      </p:transition>
+    </mc:Choice>
+    <mc:Fallback>
+      <p:transition spd="slow">
+        <p:fade/>
+      </p:transition>
+    </mc:Fallback>
+  </mc:AlternateContent>
   <p:timing>
     <p:tnLst>
       <p:par>
@@ -6519,8 +7184,8 @@
         </p:nvSpPr>
         <p:spPr>
           <a:xfrm>
-            <a:off x="1458912" y="685800"/>
-            <a:ext cx="8534400" cy="1507067"/>
+            <a:off x="0" y="0"/>
+            <a:ext cx="12192000" cy="1507067"/>
           </a:xfrm>
         </p:spPr>
         <p:txBody>
@@ -6529,20 +7194,8 @@
           <a:p>
             <a:pPr algn="ctr"/>
             <a:r>
-              <a:rPr lang="en-US" dirty="0" smtClean="0"/>
-              <a:t>La </a:t>
-            </a:r>
-            <a:r>
-              <a:rPr lang="en-US" dirty="0" err="1" smtClean="0"/>
-              <a:t>gestion</a:t>
-            </a:r>
-            <a:r>
-              <a:rPr lang="en-US" dirty="0" smtClean="0"/>
-              <a:t> des </a:t>
-            </a:r>
-            <a:r>
-              <a:rPr lang="en-US" dirty="0" err="1" smtClean="0"/>
-              <a:t>utilisateurs</a:t>
+              <a:rPr lang="en-US" dirty="0"/>
+              <a:t>user management</a:t>
             </a:r>
             <a:endParaRPr lang="en-US" dirty="0"/>
           </a:p>
@@ -6573,27 +7226,107 @@
       </p:sp>
       <p:pic>
         <p:nvPicPr>
-          <p:cNvPr id="3" name="Image 2"/>
+          <p:cNvPr id="6" name="Image 5"/>
+          <p:cNvPicPr>
+            <a:picLocks noChangeAspect="1"/>
+          </p:cNvPicPr>
+          <p:nvPr/>
+        </p:nvPicPr>
+        <p:blipFill>
+          <a:blip r:embed="rId2">
+            <a:extLst>
+              <a:ext uri="{28A0092B-C50C-407E-A947-70E740481C1C}">
+                <a14:useLocalDpi xmlns:a14="http://schemas.microsoft.com/office/drawing/2010/main" val="0"/>
+              </a:ext>
+            </a:extLst>
+          </a:blip>
+          <a:stretch>
+            <a:fillRect/>
+          </a:stretch>
+        </p:blipFill>
+        <p:spPr>
+          <a:xfrm>
+            <a:off x="10173376" y="317398"/>
+            <a:ext cx="1713838" cy="1497955"/>
+          </a:xfrm>
+          <a:prstGeom prst="rect">
+            <a:avLst/>
+          </a:prstGeom>
+        </p:spPr>
+      </p:pic>
+      <p:pic>
+        <p:nvPicPr>
+          <p:cNvPr id="7" name="Image 6"/>
           <p:cNvPicPr>
             <a:picLocks noChangeAspect="1"/>
           </p:cNvPicPr>
           <p:nvPr/>
         </p:nvPicPr>
         <p:blipFill rotWithShape="1">
-          <a:blip r:embed="rId2"/>
-          <a:srcRect l="1700" t="12133" r="1770" b="36029"/>
+          <a:blip r:embed="rId3"/>
+          <a:srcRect l="12519" t="20140" r="14056" b="14757"/>
           <a:stretch/>
         </p:blipFill>
         <p:spPr>
           <a:xfrm>
-            <a:off x="1829087" y="1842246"/>
-            <a:ext cx="7794049" cy="2353235"/>
+            <a:off x="2077035" y="1170469"/>
+            <a:ext cx="7791555" cy="3884131"/>
           </a:xfrm>
           <a:prstGeom prst="rect">
             <a:avLst/>
           </a:prstGeom>
         </p:spPr>
       </p:pic>
+      <p:sp>
+        <p:nvSpPr>
+          <p:cNvPr id="8" name="ZoneTexte 7"/>
+          <p:cNvSpPr txBox="1"/>
+          <p:nvPr/>
+        </p:nvSpPr>
+        <p:spPr>
+          <a:xfrm>
+            <a:off x="2077035" y="5070475"/>
+            <a:ext cx="7791555" cy="646331"/>
+          </a:xfrm>
+          <a:prstGeom prst="rect">
+            <a:avLst/>
+          </a:prstGeom>
+          <a:noFill/>
+        </p:spPr>
+        <p:txBody>
+          <a:bodyPr wrap="square" rtlCol="0">
+            <a:spAutoFit/>
+          </a:bodyPr>
+          <a:lstStyle/>
+          <a:p>
+            <a:r>
+              <a:rPr lang="en-US" dirty="0"/>
+              <a:t>User management is accessible only from an administrator account and allows </a:t>
+            </a:r>
+            <a:r>
+              <a:rPr lang="en-US" dirty="0" smtClean="0"/>
+              <a:t>to </a:t>
+            </a:r>
+            <a:r>
+              <a:rPr lang="en-US" dirty="0"/>
+              <a:t>delete </a:t>
+            </a:r>
+            <a:r>
+              <a:rPr lang="en-US" dirty="0" smtClean="0"/>
+              <a:t>an </a:t>
+            </a:r>
+            <a:r>
+              <a:rPr lang="en-US" dirty="0"/>
+              <a:t>user account or change its </a:t>
+            </a:r>
+            <a:r>
+              <a:rPr lang="en-US" dirty="0" smtClean="0"/>
+              <a:t>rights.</a:t>
+            </a:r>
+            <a:endParaRPr lang="en-US" dirty="0"/>
+          </a:p>
+        </p:txBody>
+      </p:sp>
     </p:spTree>
     <p:extLst>
       <p:ext uri="{BB962C8B-B14F-4D97-AF65-F5344CB8AC3E}">
@@ -6604,6 +7337,18 @@
   <p:clrMapOvr>
     <a:masterClrMapping/>
   </p:clrMapOvr>
+  <mc:AlternateContent xmlns:mc="http://schemas.openxmlformats.org/markup-compatibility/2006">
+    <mc:Choice xmlns:p14="http://schemas.microsoft.com/office/powerpoint/2010/main" Requires="p14">
+      <p:transition spd="slow" p14:dur="1500">
+        <p14:window dir="vert"/>
+      </p:transition>
+    </mc:Choice>
+    <mc:Fallback>
+      <p:transition spd="slow">
+        <p:fade/>
+      </p:transition>
+    </mc:Fallback>
+  </mc:AlternateContent>
   <p:timing>
     <p:tnLst>
       <p:par>
@@ -6643,8 +7388,8 @@
         </p:nvSpPr>
         <p:spPr>
           <a:xfrm>
-            <a:off x="0" y="1"/>
-            <a:ext cx="12192000" cy="1162050"/>
+            <a:off x="0" y="469153"/>
+            <a:ext cx="12192000" cy="1346199"/>
           </a:xfrm>
         </p:spPr>
         <p:txBody>
@@ -6653,16 +7398,8 @@
           <a:p>
             <a:pPr algn="ctr"/>
             <a:r>
-              <a:rPr lang="en-US" dirty="0" err="1" smtClean="0"/>
-              <a:t>Améliorations</a:t>
-            </a:r>
-            <a:r>
               <a:rPr lang="en-US" dirty="0" smtClean="0"/>
-              <a:t> </a:t>
-            </a:r>
-            <a:r>
-              <a:rPr lang="en-US" dirty="0" err="1" smtClean="0"/>
-              <a:t>possibles</a:t>
+              <a:t>Improvements</a:t>
             </a:r>
             <a:endParaRPr lang="en-US" dirty="0"/>
           </a:p>
@@ -6688,6 +7425,104 @@
               <a:t>14</a:t>
             </a:fld>
             <a:endParaRPr lang="fr-FR"/>
+          </a:p>
+        </p:txBody>
+      </p:sp>
+      <p:pic>
+        <p:nvPicPr>
+          <p:cNvPr id="6" name="Image 5"/>
+          <p:cNvPicPr>
+            <a:picLocks noChangeAspect="1"/>
+          </p:cNvPicPr>
+          <p:nvPr/>
+        </p:nvPicPr>
+        <p:blipFill>
+          <a:blip r:embed="rId2">
+            <a:extLst>
+              <a:ext uri="{28A0092B-C50C-407E-A947-70E740481C1C}">
+                <a14:useLocalDpi xmlns:a14="http://schemas.microsoft.com/office/drawing/2010/main" val="0"/>
+              </a:ext>
+            </a:extLst>
+          </a:blip>
+          <a:stretch>
+            <a:fillRect/>
+          </a:stretch>
+        </p:blipFill>
+        <p:spPr>
+          <a:xfrm>
+            <a:off x="10173376" y="317398"/>
+            <a:ext cx="1713838" cy="1497955"/>
+          </a:xfrm>
+          <a:prstGeom prst="rect">
+            <a:avLst/>
+          </a:prstGeom>
+        </p:spPr>
+      </p:pic>
+      <p:sp>
+        <p:nvSpPr>
+          <p:cNvPr id="7" name="Espace réservé du contenu 2"/>
+          <p:cNvSpPr>
+            <a:spLocks noGrp="1"/>
+          </p:cNvSpPr>
+          <p:nvPr>
+            <p:ph idx="1"/>
+          </p:nvPr>
+        </p:nvSpPr>
+        <p:spPr>
+          <a:xfrm>
+            <a:off x="2495895" y="1889280"/>
+            <a:ext cx="8534400" cy="3615267"/>
+          </a:xfrm>
+        </p:spPr>
+        <p:txBody>
+          <a:bodyPr anchor="ctr">
+            <a:normAutofit/>
+          </a:bodyPr>
+          <a:lstStyle/>
+          <a:p>
+            <a:r>
+              <a:rPr lang="en-GB" sz="2400" dirty="0" smtClean="0">
+                <a:solidFill>
+                  <a:schemeClr val="tx1"/>
+                </a:solidFill>
+              </a:rPr>
+              <a:t>Task merge system</a:t>
+            </a:r>
+          </a:p>
+          <a:p>
+            <a:r>
+              <a:rPr lang="en-GB" sz="2400" dirty="0" smtClean="0">
+                <a:solidFill>
+                  <a:schemeClr val="tx1"/>
+                </a:solidFill>
+              </a:rPr>
+              <a:t>Editing tasks</a:t>
+            </a:r>
+          </a:p>
+          <a:p>
+            <a:r>
+              <a:rPr lang="en-GB" sz="2400" dirty="0" smtClean="0">
+                <a:solidFill>
+                  <a:schemeClr val="tx1"/>
+                </a:solidFill>
+              </a:rPr>
+              <a:t>deleting tasks</a:t>
+            </a:r>
+          </a:p>
+          <a:p>
+            <a:r>
+              <a:rPr lang="en-GB" sz="2400" dirty="0">
+                <a:solidFill>
+                  <a:schemeClr val="tx1"/>
+                </a:solidFill>
+              </a:rPr>
+              <a:t>email alerts</a:t>
+            </a:r>
+            <a:endParaRPr lang="en-GB" sz="2400" dirty="0">
+              <a:solidFill>
+                <a:schemeClr val="tx1"/>
+              </a:solidFill>
+            </a:endParaRPr>
           </a:p>
         </p:txBody>
       </p:sp>
@@ -6701,6 +7536,18 @@
   <p:clrMapOvr>
     <a:masterClrMapping/>
   </p:clrMapOvr>
+  <mc:AlternateContent xmlns:mc="http://schemas.openxmlformats.org/markup-compatibility/2006">
+    <mc:Choice xmlns:p14="http://schemas.microsoft.com/office/powerpoint/2010/main" Requires="p14">
+      <p:transition spd="slow" p14:dur="1600">
+        <p14:conveyor dir="l"/>
+      </p:transition>
+    </mc:Choice>
+    <mc:Fallback>
+      <p:transition spd="slow">
+        <p:fade/>
+      </p:transition>
+    </mc:Fallback>
+  </mc:AlternateContent>
   <p:timing>
     <p:tnLst>
       <p:par>
@@ -6750,10 +7597,10 @@
           <a:p>
             <a:pPr algn="ctr"/>
             <a:r>
-              <a:rPr lang="fr-FR" dirty="0" smtClean="0"/>
-              <a:t>Les difficultés rencontrées</a:t>
-            </a:r>
-            <a:endParaRPr lang="fr-FR" dirty="0"/>
+              <a:rPr lang="en-GB" dirty="0" smtClean="0"/>
+              <a:t>difficulties</a:t>
+            </a:r>
+            <a:endParaRPr lang="en-GB" dirty="0"/>
           </a:p>
         </p:txBody>
       </p:sp>
@@ -6769,30 +7616,144 @@
         </p:nvSpPr>
         <p:spPr>
           <a:xfrm>
-            <a:off x="1331912" y="2387600"/>
+            <a:off x="2399922" y="2141754"/>
             <a:ext cx="8534400" cy="3615267"/>
           </a:xfrm>
         </p:spPr>
         <p:txBody>
-          <a:bodyPr/>
-          <a:lstStyle/>
-          <a:p>
-            <a:r>
-              <a:rPr lang="fr-FR" dirty="0" smtClean="0"/>
-              <a:t>Système drag and drop avec intégration dans la </a:t>
-            </a:r>
-            <a:r>
-              <a:rPr lang="fr-FR" dirty="0" err="1" smtClean="0"/>
-              <a:t>bdd</a:t>
-            </a:r>
-            <a:endParaRPr lang="fr-FR" dirty="0" smtClean="0"/>
-          </a:p>
-          <a:p>
-            <a:r>
-              <a:rPr lang="fr-FR" dirty="0" smtClean="0"/>
-              <a:t>Manque de temps pour finir l’application</a:t>
-            </a:r>
-            <a:endParaRPr lang="fr-FR" dirty="0"/>
+          <a:bodyPr>
+            <a:normAutofit/>
+          </a:bodyPr>
+          <a:lstStyle/>
+          <a:p>
+            <a:r>
+              <a:rPr lang="fr-FR" sz="2400" dirty="0">
+                <a:solidFill>
+                  <a:schemeClr val="tx1"/>
+                </a:solidFill>
+              </a:rPr>
+              <a:t>Drag and drop </a:t>
+            </a:r>
+            <a:r>
+              <a:rPr lang="fr-FR" sz="2400" dirty="0" smtClean="0">
+                <a:solidFill>
+                  <a:schemeClr val="tx1"/>
+                </a:solidFill>
+              </a:rPr>
+              <a:t>system</a:t>
+            </a:r>
+          </a:p>
+          <a:p>
+            <a:r>
+              <a:rPr lang="en-US" sz="2400" dirty="0" smtClean="0">
+                <a:solidFill>
+                  <a:schemeClr val="tx1"/>
+                </a:solidFill>
+              </a:rPr>
+              <a:t>Bad </a:t>
+            </a:r>
+            <a:r>
+              <a:rPr lang="en-US" sz="2400" dirty="0">
+                <a:solidFill>
+                  <a:schemeClr val="tx1"/>
+                </a:solidFill>
+              </a:rPr>
+              <a:t>estimate of task durations</a:t>
+            </a:r>
+            <a:endParaRPr lang="fr-FR" sz="2400" dirty="0">
+              <a:solidFill>
+                <a:schemeClr val="tx1"/>
+              </a:solidFill>
+            </a:endParaRPr>
+          </a:p>
+          <a:p>
+            <a:r>
+              <a:rPr lang="fr-FR" sz="2400" dirty="0" err="1">
+                <a:solidFill>
+                  <a:schemeClr val="tx1"/>
+                </a:solidFill>
+              </a:rPr>
+              <a:t>Lack</a:t>
+            </a:r>
+            <a:r>
+              <a:rPr lang="fr-FR" sz="2400" dirty="0">
+                <a:solidFill>
+                  <a:schemeClr val="tx1"/>
+                </a:solidFill>
+              </a:rPr>
+              <a:t> </a:t>
+            </a:r>
+            <a:r>
+              <a:rPr lang="fr-FR" sz="2400" dirty="0">
+                <a:solidFill>
+                  <a:schemeClr val="tx1"/>
+                </a:solidFill>
+              </a:rPr>
+              <a:t>of </a:t>
+            </a:r>
+            <a:r>
+              <a:rPr lang="fr-FR" sz="2400" dirty="0" smtClean="0">
+                <a:solidFill>
+                  <a:schemeClr val="tx1"/>
+                </a:solidFill>
+              </a:rPr>
+              <a:t>time</a:t>
+            </a:r>
+          </a:p>
+          <a:p>
+            <a:r>
+              <a:rPr lang="fr-FR" sz="2400" dirty="0" err="1" smtClean="0">
+                <a:solidFill>
+                  <a:schemeClr val="tx1"/>
+                </a:solidFill>
+              </a:rPr>
+              <a:t>Difficult</a:t>
+            </a:r>
+            <a:r>
+              <a:rPr lang="fr-FR" sz="2400" dirty="0" smtClean="0">
+                <a:solidFill>
+                  <a:schemeClr val="tx1"/>
+                </a:solidFill>
+              </a:rPr>
+              <a:t> </a:t>
+            </a:r>
+            <a:r>
+              <a:rPr lang="fr-FR" sz="2400" dirty="0">
+                <a:solidFill>
+                  <a:schemeClr val="tx1"/>
+                </a:solidFill>
+              </a:rPr>
+              <a:t>to </a:t>
+            </a:r>
+            <a:r>
+              <a:rPr lang="fr-FR" sz="2400" dirty="0" err="1">
+                <a:solidFill>
+                  <a:schemeClr val="tx1"/>
+                </a:solidFill>
+              </a:rPr>
+              <a:t>reach</a:t>
+            </a:r>
+            <a:r>
+              <a:rPr lang="fr-FR" sz="2400" dirty="0">
+                <a:solidFill>
+                  <a:schemeClr val="tx1"/>
+                </a:solidFill>
+              </a:rPr>
+              <a:t> </a:t>
+            </a:r>
+            <a:r>
+              <a:rPr lang="fr-FR" sz="2400" dirty="0" err="1">
+                <a:solidFill>
+                  <a:schemeClr val="tx1"/>
+                </a:solidFill>
+              </a:rPr>
+              <a:t>customer</a:t>
+            </a:r>
+            <a:endParaRPr lang="fr-FR" sz="2400" dirty="0">
+              <a:solidFill>
+                <a:schemeClr val="tx1"/>
+              </a:solidFill>
+            </a:endParaRPr>
           </a:p>
         </p:txBody>
       </p:sp>
@@ -6819,6 +7780,36 @@
           </a:p>
         </p:txBody>
       </p:sp>
+      <p:pic>
+        <p:nvPicPr>
+          <p:cNvPr id="6" name="Image 5"/>
+          <p:cNvPicPr>
+            <a:picLocks noChangeAspect="1"/>
+          </p:cNvPicPr>
+          <p:nvPr/>
+        </p:nvPicPr>
+        <p:blipFill>
+          <a:blip r:embed="rId2">
+            <a:extLst>
+              <a:ext uri="{28A0092B-C50C-407E-A947-70E740481C1C}">
+                <a14:useLocalDpi xmlns:a14="http://schemas.microsoft.com/office/drawing/2010/main" val="0"/>
+              </a:ext>
+            </a:extLst>
+          </a:blip>
+          <a:stretch>
+            <a:fillRect/>
+          </a:stretch>
+        </p:blipFill>
+        <p:spPr>
+          <a:xfrm>
+            <a:off x="10173376" y="317398"/>
+            <a:ext cx="1713838" cy="1497955"/>
+          </a:xfrm>
+          <a:prstGeom prst="rect">
+            <a:avLst/>
+          </a:prstGeom>
+        </p:spPr>
+      </p:pic>
     </p:spTree>
     <p:extLst>
       <p:ext uri="{BB962C8B-B14F-4D97-AF65-F5344CB8AC3E}">
@@ -6829,6 +7820,18 @@
   <p:clrMapOvr>
     <a:masterClrMapping/>
   </p:clrMapOvr>
+  <mc:AlternateContent xmlns:mc="http://schemas.openxmlformats.org/markup-compatibility/2006">
+    <mc:Choice xmlns:p14="http://schemas.microsoft.com/office/powerpoint/2010/main" Requires="p14">
+      <p:transition spd="slow" p14:dur="1600">
+        <p14:prism isContent="1" isInverted="1"/>
+      </p:transition>
+    </mc:Choice>
+    <mc:Fallback>
+      <p:transition spd="slow">
+        <p:fade/>
+      </p:transition>
+    </mc:Fallback>
+  </mc:AlternateContent>
   <p:timing>
     <p:tnLst>
       <p:par>
@@ -6878,8 +7881,8 @@
           <a:p>
             <a:pPr algn="ctr"/>
             <a:r>
-              <a:rPr lang="fr-FR" dirty="0" smtClean="0"/>
-              <a:t>Bilan du projet</a:t>
+              <a:rPr lang="fr-FR" dirty="0" err="1" smtClean="0"/>
+              <a:t>results</a:t>
             </a:r>
             <a:endParaRPr lang="fr-FR" dirty="0"/>
           </a:p>
@@ -6902,10 +7905,140 @@
           </a:xfrm>
         </p:spPr>
         <p:txBody>
-          <a:bodyPr anchor="t"/>
-          <a:lstStyle/>
-          <a:p>
-            <a:endParaRPr lang="fr-FR" dirty="0"/>
+          <a:bodyPr anchor="ctr"/>
+          <a:lstStyle/>
+          <a:p>
+            <a:r>
+              <a:rPr lang="fr-FR" dirty="0" smtClean="0"/>
+              <a:t>	</a:t>
+            </a:r>
+            <a:r>
+              <a:rPr lang="fr-FR" sz="2400" dirty="0">
+                <a:solidFill>
+                  <a:schemeClr val="tx1"/>
+                </a:solidFill>
+              </a:rPr>
+              <a:t>Team </a:t>
+            </a:r>
+            <a:r>
+              <a:rPr lang="fr-FR" sz="2400" dirty="0" err="1">
+                <a:solidFill>
+                  <a:schemeClr val="tx1"/>
+                </a:solidFill>
+              </a:rPr>
+              <a:t>work</a:t>
+            </a:r>
+            <a:r>
+              <a:rPr lang="fr-FR" sz="2400" dirty="0">
+                <a:solidFill>
+                  <a:schemeClr val="tx1"/>
+                </a:solidFill>
+              </a:rPr>
+              <a:t> </a:t>
+            </a:r>
+            <a:r>
+              <a:rPr lang="fr-FR" sz="2400" dirty="0" err="1" smtClean="0">
+                <a:solidFill>
+                  <a:schemeClr val="tx1"/>
+                </a:solidFill>
+              </a:rPr>
+              <a:t>experience</a:t>
+            </a:r>
+            <a:r>
+              <a:rPr lang="fr-FR" sz="2400" dirty="0">
+                <a:solidFill>
+                  <a:schemeClr val="tx1"/>
+                </a:solidFill>
+              </a:rPr>
+              <a:t> </a:t>
+            </a:r>
+            <a:r>
+              <a:rPr lang="en-US" sz="2400" dirty="0" smtClean="0">
+                <a:solidFill>
+                  <a:schemeClr val="tx1"/>
+                </a:solidFill>
+              </a:rPr>
+              <a:t>with </a:t>
+            </a:r>
+            <a:r>
+              <a:rPr lang="en-US" sz="2400" dirty="0">
+                <a:solidFill>
+                  <a:schemeClr val="tx1"/>
+                </a:solidFill>
+              </a:rPr>
+              <a:t>a professional </a:t>
+            </a:r>
+            <a:r>
+              <a:rPr lang="en-US" sz="2400" dirty="0" smtClean="0">
+                <a:solidFill>
+                  <a:schemeClr val="tx1"/>
+                </a:solidFill>
+              </a:rPr>
+              <a:t>client</a:t>
+            </a:r>
+          </a:p>
+          <a:p>
+            <a:r>
+              <a:rPr lang="en-US" sz="2400" dirty="0" smtClean="0">
+                <a:solidFill>
+                  <a:schemeClr val="tx1"/>
+                </a:solidFill>
+              </a:rPr>
+              <a:t>  Discovery </a:t>
+            </a:r>
+            <a:r>
+              <a:rPr lang="en-US" sz="2400" dirty="0">
+                <a:solidFill>
+                  <a:schemeClr val="tx1"/>
+                </a:solidFill>
+              </a:rPr>
+              <a:t>of new </a:t>
+            </a:r>
+            <a:r>
+              <a:rPr lang="en-US" sz="2400" dirty="0">
+                <a:solidFill>
+                  <a:schemeClr val="tx1"/>
+                </a:solidFill>
+              </a:rPr>
+              <a:t>API </a:t>
+            </a:r>
+            <a:endParaRPr lang="en-US" sz="2400" dirty="0" smtClean="0">
+              <a:solidFill>
+                <a:schemeClr val="tx1"/>
+              </a:solidFill>
+            </a:endParaRPr>
+          </a:p>
+          <a:p>
+            <a:r>
+              <a:rPr lang="en-US" sz="2400" dirty="0" smtClean="0">
+                <a:solidFill>
+                  <a:schemeClr val="tx1"/>
+                </a:solidFill>
+              </a:rPr>
+              <a:t>  Improving </a:t>
+            </a:r>
+            <a:r>
+              <a:rPr lang="en-US" sz="2400" dirty="0">
+                <a:solidFill>
+                  <a:schemeClr val="tx1"/>
+                </a:solidFill>
+              </a:rPr>
+              <a:t>skills in PHP and jQuery</a:t>
+            </a:r>
+          </a:p>
+          <a:p>
+            <a:endParaRPr lang="en-US" sz="2400" dirty="0">
+              <a:solidFill>
+                <a:schemeClr val="tx1"/>
+              </a:solidFill>
+            </a:endParaRPr>
+          </a:p>
+          <a:p>
+            <a:endParaRPr lang="fr-FR" sz="2400" dirty="0" smtClean="0">
+              <a:solidFill>
+                <a:schemeClr val="tx1"/>
+              </a:solidFill>
+            </a:endParaRPr>
           </a:p>
         </p:txBody>
       </p:sp>
@@ -6932,6 +8065,36 @@
           </a:p>
         </p:txBody>
       </p:sp>
+      <p:pic>
+        <p:nvPicPr>
+          <p:cNvPr id="6" name="Image 5"/>
+          <p:cNvPicPr>
+            <a:picLocks noChangeAspect="1"/>
+          </p:cNvPicPr>
+          <p:nvPr/>
+        </p:nvPicPr>
+        <p:blipFill>
+          <a:blip r:embed="rId2">
+            <a:extLst>
+              <a:ext uri="{28A0092B-C50C-407E-A947-70E740481C1C}">
+                <a14:useLocalDpi xmlns:a14="http://schemas.microsoft.com/office/drawing/2010/main" val="0"/>
+              </a:ext>
+            </a:extLst>
+          </a:blip>
+          <a:stretch>
+            <a:fillRect/>
+          </a:stretch>
+        </p:blipFill>
+        <p:spPr>
+          <a:xfrm>
+            <a:off x="10173376" y="317398"/>
+            <a:ext cx="1713838" cy="1497955"/>
+          </a:xfrm>
+          <a:prstGeom prst="rect">
+            <a:avLst/>
+          </a:prstGeom>
+        </p:spPr>
+      </p:pic>
     </p:spTree>
     <p:extLst>
       <p:ext uri="{BB962C8B-B14F-4D97-AF65-F5344CB8AC3E}">
@@ -6942,6 +8105,154 @@
   <p:clrMapOvr>
     <a:masterClrMapping/>
   </p:clrMapOvr>
+  <mc:AlternateContent xmlns:mc="http://schemas.openxmlformats.org/markup-compatibility/2006">
+    <mc:Choice xmlns:p14="http://schemas.microsoft.com/office/powerpoint/2010/main" Requires="p14">
+      <p:transition spd="slow" p14:dur="1300">
+        <p14:pan dir="u"/>
+      </p:transition>
+    </mc:Choice>
+    <mc:Fallback>
+      <p:transition spd="slow">
+        <p:fade/>
+      </p:transition>
+    </mc:Fallback>
+  </mc:AlternateContent>
+  <p:timing>
+    <p:tnLst>
+      <p:par>
+        <p:cTn id="1" dur="indefinite" restart="never" nodeType="tmRoot"/>
+      </p:par>
+    </p:tnLst>
+  </p:timing>
+</p:sld>
+</file>
+
+<file path=ppt/slides/slide17.xml><?xml version="1.0" encoding="utf-8"?>
+<p:sld xmlns:a="http://schemas.openxmlformats.org/drawingml/2006/main" xmlns:r="http://schemas.openxmlformats.org/officeDocument/2006/relationships" xmlns:p="http://schemas.openxmlformats.org/presentationml/2006/main">
+  <p:cSld>
+    <p:spTree>
+      <p:nvGrpSpPr>
+        <p:cNvPr id="1" name=""/>
+        <p:cNvGrpSpPr/>
+        <p:nvPr/>
+      </p:nvGrpSpPr>
+      <p:grpSpPr>
+        <a:xfrm>
+          <a:off x="0" y="0"/>
+          <a:ext cx="0" cy="0"/>
+          <a:chOff x="0" y="0"/>
+          <a:chExt cx="0" cy="0"/>
+        </a:xfrm>
+      </p:grpSpPr>
+      <p:pic>
+        <p:nvPicPr>
+          <p:cNvPr id="6" name="Image 5"/>
+          <p:cNvPicPr>
+            <a:picLocks noChangeAspect="1"/>
+          </p:cNvPicPr>
+          <p:nvPr/>
+        </p:nvPicPr>
+        <p:blipFill>
+          <a:blip r:embed="rId2">
+            <a:extLst>
+              <a:ext uri="{28A0092B-C50C-407E-A947-70E740481C1C}">
+                <a14:useLocalDpi xmlns:a14="http://schemas.microsoft.com/office/drawing/2010/main" val="0"/>
+              </a:ext>
+            </a:extLst>
+          </a:blip>
+          <a:stretch>
+            <a:fillRect/>
+          </a:stretch>
+        </p:blipFill>
+        <p:spPr>
+          <a:xfrm>
+            <a:off x="3594776" y="550316"/>
+            <a:ext cx="5003124" cy="4372907"/>
+          </a:xfrm>
+          <a:prstGeom prst="rect">
+            <a:avLst/>
+          </a:prstGeom>
+        </p:spPr>
+      </p:pic>
+      <p:sp>
+        <p:nvSpPr>
+          <p:cNvPr id="4" name="Espace réservé du numéro de diapositive 3"/>
+          <p:cNvSpPr>
+            <a:spLocks noGrp="1"/>
+          </p:cNvSpPr>
+          <p:nvPr>
+            <p:ph type="sldNum" sz="quarter" idx="12"/>
+          </p:nvPr>
+        </p:nvSpPr>
+        <p:spPr/>
+        <p:txBody>
+          <a:bodyPr/>
+          <a:lstStyle/>
+          <a:p>
+            <a:fld id="{329D2A3D-7777-43B9-862C-AF2C35877681}" type="slidenum">
+              <a:rPr lang="fr-FR" smtClean="0"/>
+              <a:t>17</a:t>
+            </a:fld>
+            <a:endParaRPr lang="fr-FR"/>
+          </a:p>
+        </p:txBody>
+      </p:sp>
+      <p:sp>
+        <p:nvSpPr>
+          <p:cNvPr id="5" name="ZoneTexte 4"/>
+          <p:cNvSpPr txBox="1"/>
+          <p:nvPr/>
+        </p:nvSpPr>
+        <p:spPr>
+          <a:xfrm>
+            <a:off x="2373174" y="4923223"/>
+            <a:ext cx="7446328" cy="830997"/>
+          </a:xfrm>
+          <a:prstGeom prst="rect">
+            <a:avLst/>
+          </a:prstGeom>
+          <a:noFill/>
+        </p:spPr>
+        <p:txBody>
+          <a:bodyPr wrap="square" rtlCol="0">
+            <a:spAutoFit/>
+          </a:bodyPr>
+          <a:lstStyle/>
+          <a:p>
+            <a:r>
+              <a:rPr lang="en-US" sz="4800" b="1" dirty="0" smtClean="0">
+                <a:latin typeface="Lobster Two" panose="02000506000000020003" pitchFamily="50" charset="0"/>
+              </a:rPr>
+              <a:t>Thank you for your attention</a:t>
+            </a:r>
+            <a:endParaRPr lang="en-US" sz="4800" b="1" dirty="0">
+              <a:latin typeface="Lobster Two" panose="02000506000000020003" pitchFamily="50" charset="0"/>
+            </a:endParaRPr>
+          </a:p>
+        </p:txBody>
+      </p:sp>
+    </p:spTree>
+    <p:extLst>
+      <p:ext uri="{BB962C8B-B14F-4D97-AF65-F5344CB8AC3E}">
+        <p14:creationId xmlns:p14="http://schemas.microsoft.com/office/powerpoint/2010/main" val="1227601447"/>
+      </p:ext>
+    </p:extLst>
+  </p:cSld>
+  <p:clrMapOvr>
+    <a:masterClrMapping/>
+  </p:clrMapOvr>
+  <mc:AlternateContent xmlns:mc="http://schemas.openxmlformats.org/markup-compatibility/2006">
+    <mc:Choice xmlns:p14="http://schemas.microsoft.com/office/powerpoint/2010/main" Requires="p14">
+      <p:transition spd="slow" p14:dur="1600">
+        <p14:conveyor dir="l"/>
+      </p:transition>
+    </mc:Choice>
+    <mc:Fallback>
+      <p:transition spd="slow">
+        <p:fade/>
+      </p:transition>
+    </mc:Fallback>
+  </mc:AlternateContent>
   <p:timing>
     <p:tnLst>
       <p:par>
@@ -6971,34 +8282,6 @@
       </p:grpSpPr>
       <p:sp>
         <p:nvSpPr>
-          <p:cNvPr id="2" name="Titre 1"/>
-          <p:cNvSpPr>
-            <a:spLocks noGrp="1"/>
-          </p:cNvSpPr>
-          <p:nvPr>
-            <p:ph type="title"/>
-          </p:nvPr>
-        </p:nvSpPr>
-        <p:spPr>
-          <a:xfrm>
-            <a:off x="773112" y="685800"/>
-            <a:ext cx="8534400" cy="1507067"/>
-          </a:xfrm>
-        </p:spPr>
-        <p:txBody>
-          <a:bodyPr/>
-          <a:lstStyle/>
-          <a:p>
-            <a:r>
-              <a:rPr lang="en-US" dirty="0" smtClean="0"/>
-              <a:t>Customer demand</a:t>
-            </a:r>
-            <a:endParaRPr lang="en-US" dirty="0"/>
-          </a:p>
-        </p:txBody>
-      </p:sp>
-      <p:sp>
-        <p:nvSpPr>
           <p:cNvPr id="3" name="Espace réservé du contenu 2"/>
           <p:cNvSpPr>
             <a:spLocks noGrp="1"/>
@@ -7014,90 +8297,80 @@
           </a:xfrm>
         </p:spPr>
         <p:txBody>
-          <a:bodyPr anchor="t"/>
-          <a:lstStyle/>
-          <a:p>
-            <a:r>
-              <a:rPr lang="en-US" dirty="0" smtClean="0"/>
-              <a:t>La </a:t>
-            </a:r>
-            <a:r>
-              <a:rPr lang="en-US" dirty="0" err="1" smtClean="0"/>
-              <a:t>demande</a:t>
-            </a:r>
-            <a:r>
-              <a:rPr lang="en-US" dirty="0" smtClean="0"/>
-              <a:t> du client </a:t>
-            </a:r>
-            <a:r>
-              <a:rPr lang="en-US" dirty="0" err="1" smtClean="0"/>
-              <a:t>était</a:t>
-            </a:r>
-            <a:r>
-              <a:rPr lang="en-US" dirty="0" smtClean="0"/>
-              <a:t> de developer </a:t>
-            </a:r>
-            <a:r>
-              <a:rPr lang="en-US" dirty="0" err="1" smtClean="0"/>
-              <a:t>une</a:t>
-            </a:r>
-            <a:r>
-              <a:rPr lang="en-US" dirty="0" smtClean="0"/>
-              <a:t> application </a:t>
-            </a:r>
-            <a:r>
-              <a:rPr lang="en-US" dirty="0" err="1" smtClean="0"/>
-              <a:t>dans</a:t>
-            </a:r>
-            <a:r>
-              <a:rPr lang="en-US" dirty="0" smtClean="0"/>
-              <a:t> le style de drop task, avec un </a:t>
-            </a:r>
-            <a:r>
-              <a:rPr lang="en-US" dirty="0" err="1" smtClean="0"/>
-              <a:t>systeme</a:t>
-            </a:r>
-            <a:r>
-              <a:rPr lang="en-US" dirty="0"/>
-              <a:t> </a:t>
-            </a:r>
-            <a:r>
-              <a:rPr lang="en-US" dirty="0" smtClean="0"/>
-              <a:t>de drag and drop et </a:t>
-            </a:r>
-            <a:r>
-              <a:rPr lang="en-US" dirty="0" err="1" smtClean="0"/>
-              <a:t>une</a:t>
-            </a:r>
-            <a:r>
-              <a:rPr lang="en-US" dirty="0" smtClean="0"/>
-              <a:t> </a:t>
-            </a:r>
-            <a:r>
-              <a:rPr lang="en-US" dirty="0" err="1" smtClean="0"/>
-              <a:t>gestion</a:t>
-            </a:r>
-            <a:r>
-              <a:rPr lang="en-US" dirty="0" smtClean="0"/>
-              <a:t> des </a:t>
-            </a:r>
-            <a:r>
-              <a:rPr lang="en-US" dirty="0" err="1" smtClean="0"/>
-              <a:t>utilisateurs</a:t>
-            </a:r>
-            <a:r>
-              <a:rPr lang="en-US" dirty="0" smtClean="0"/>
-              <a:t>, un </a:t>
-            </a:r>
-            <a:r>
-              <a:rPr lang="en-US" dirty="0" err="1" smtClean="0"/>
-              <a:t>calendrier</a:t>
-            </a:r>
-            <a:r>
-              <a:rPr lang="en-US" dirty="0" smtClean="0"/>
-              <a:t>.</a:t>
-            </a:r>
-            <a:endParaRPr lang="en-US" dirty="0"/>
+          <a:bodyPr anchor="t">
+            <a:normAutofit/>
+          </a:bodyPr>
+          <a:lstStyle/>
+          <a:p>
+            <a:r>
+              <a:rPr lang="en-US" sz="2400" dirty="0">
+                <a:solidFill>
+                  <a:schemeClr val="tx1"/>
+                </a:solidFill>
+              </a:rPr>
+              <a:t>create a task management </a:t>
+            </a:r>
+            <a:r>
+              <a:rPr lang="en-US" sz="2400" dirty="0" smtClean="0">
+                <a:solidFill>
+                  <a:schemeClr val="tx1"/>
+                </a:solidFill>
+              </a:rPr>
+              <a:t>application with:</a:t>
+            </a:r>
+          </a:p>
+          <a:p>
+            <a:endParaRPr lang="en-US" sz="2400" dirty="0">
+              <a:solidFill>
+                <a:schemeClr val="tx1"/>
+              </a:solidFill>
+            </a:endParaRPr>
+          </a:p>
+          <a:p>
+            <a:pPr lvl="3"/>
+            <a:r>
+              <a:rPr lang="en-US" sz="2400" dirty="0" smtClean="0">
+                <a:solidFill>
+                  <a:schemeClr val="tx1"/>
+                </a:solidFill>
+              </a:rPr>
+              <a:t>Drag and drop system</a:t>
+            </a:r>
+          </a:p>
+          <a:p>
+            <a:pPr lvl="3"/>
+            <a:r>
+              <a:rPr lang="en-US" sz="2400" dirty="0" smtClean="0">
+                <a:solidFill>
+                  <a:schemeClr val="tx1"/>
+                </a:solidFill>
+              </a:rPr>
+              <a:t>Calendar</a:t>
+            </a:r>
+          </a:p>
+          <a:p>
+            <a:pPr lvl="3"/>
+            <a:r>
+              <a:rPr lang="en-US" sz="2400" dirty="0">
+                <a:solidFill>
+                  <a:schemeClr val="tx1"/>
+                </a:solidFill>
+              </a:rPr>
+              <a:t>tasks displayed </a:t>
+            </a:r>
+            <a:r>
+              <a:rPr lang="en-US" sz="2400" dirty="0" smtClean="0">
+                <a:solidFill>
+                  <a:schemeClr val="tx1"/>
+                </a:solidFill>
+              </a:rPr>
+              <a:t>like post-it</a:t>
+            </a:r>
+            <a:endParaRPr lang="en-US" sz="2400" dirty="0">
+              <a:solidFill>
+                <a:schemeClr val="tx1"/>
+              </a:solidFill>
+            </a:endParaRPr>
           </a:p>
         </p:txBody>
       </p:sp>
@@ -7124,6 +8397,64 @@
           </a:p>
         </p:txBody>
       </p:sp>
+      <p:sp>
+        <p:nvSpPr>
+          <p:cNvPr id="6" name="Titre 1"/>
+          <p:cNvSpPr>
+            <a:spLocks noGrp="1"/>
+          </p:cNvSpPr>
+          <p:nvPr>
+            <p:ph type="title"/>
+          </p:nvPr>
+        </p:nvSpPr>
+        <p:spPr>
+          <a:xfrm>
+            <a:off x="684212" y="685800"/>
+            <a:ext cx="8534400" cy="1507067"/>
+          </a:xfrm>
+        </p:spPr>
+        <p:txBody>
+          <a:bodyPr/>
+          <a:lstStyle/>
+          <a:p>
+            <a:r>
+              <a:rPr lang="en-US" dirty="0" smtClean="0"/>
+              <a:t>Customer demand</a:t>
+            </a:r>
+            <a:endParaRPr lang="en-US" dirty="0"/>
+          </a:p>
+        </p:txBody>
+      </p:sp>
+      <p:pic>
+        <p:nvPicPr>
+          <p:cNvPr id="7" name="Image 6"/>
+          <p:cNvPicPr>
+            <a:picLocks noChangeAspect="1"/>
+          </p:cNvPicPr>
+          <p:nvPr/>
+        </p:nvPicPr>
+        <p:blipFill>
+          <a:blip r:embed="rId3">
+            <a:extLst>
+              <a:ext uri="{28A0092B-C50C-407E-A947-70E740481C1C}">
+                <a14:useLocalDpi xmlns:a14="http://schemas.microsoft.com/office/drawing/2010/main" val="0"/>
+              </a:ext>
+            </a:extLst>
+          </a:blip>
+          <a:stretch>
+            <a:fillRect/>
+          </a:stretch>
+        </p:blipFill>
+        <p:spPr>
+          <a:xfrm>
+            <a:off x="10173376" y="317398"/>
+            <a:ext cx="1713838" cy="1497955"/>
+          </a:xfrm>
+          <a:prstGeom prst="rect">
+            <a:avLst/>
+          </a:prstGeom>
+        </p:spPr>
+      </p:pic>
     </p:spTree>
     <p:extLst>
       <p:ext uri="{BB962C8B-B14F-4D97-AF65-F5344CB8AC3E}">
@@ -7134,6 +8465,18 @@
   <p:clrMapOvr>
     <a:masterClrMapping/>
   </p:clrMapOvr>
+  <mc:AlternateContent xmlns:mc="http://schemas.openxmlformats.org/markup-compatibility/2006">
+    <mc:Choice xmlns:p14="http://schemas.microsoft.com/office/powerpoint/2010/main" Requires="p14">
+      <p:transition spd="slow" p14:dur="1600">
+        <p14:conveyor dir="l"/>
+      </p:transition>
+    </mc:Choice>
+    <mc:Fallback>
+      <p:transition spd="slow">
+        <p:fade/>
+      </p:transition>
+    </mc:Fallback>
+  </mc:AlternateContent>
   <p:timing>
     <p:tnLst>
       <p:par>
@@ -7212,7 +8555,11 @@
           <a:lstStyle/>
           <a:p>
             <a:r>
-              <a:rPr lang="en-US" dirty="0" smtClean="0"/>
+              <a:rPr lang="en-US" dirty="0" smtClean="0">
+                <a:solidFill>
+                  <a:schemeClr val="tx1"/>
+                </a:solidFill>
+              </a:rPr>
               <a:t>This application was developed in:</a:t>
             </a:r>
           </a:p>
@@ -7266,8 +8613,8 @@
         </p:blipFill>
         <p:spPr>
           <a:xfrm>
-            <a:off x="876741" y="2708274"/>
-            <a:ext cx="1663700" cy="1663700"/>
+            <a:off x="357476" y="3272974"/>
+            <a:ext cx="1381162" cy="1381162"/>
           </a:xfrm>
           <a:prstGeom prst="rect">
             <a:avLst/>
@@ -7296,8 +8643,8 @@
         </p:blipFill>
         <p:spPr>
           <a:xfrm>
-            <a:off x="3025105" y="2681287"/>
-            <a:ext cx="1186036" cy="1663700"/>
+            <a:off x="1967271" y="3272974"/>
+            <a:ext cx="1010418" cy="1417354"/>
           </a:xfrm>
           <a:prstGeom prst="rect">
             <a:avLst/>
@@ -7326,8 +8673,8 @@
         </p:blipFill>
         <p:spPr>
           <a:xfrm>
-            <a:off x="5284941" y="4371974"/>
-            <a:ext cx="1931988" cy="1931988"/>
+            <a:off x="4973744" y="3363532"/>
+            <a:ext cx="1171362" cy="1171362"/>
           </a:xfrm>
           <a:prstGeom prst="rect">
             <a:avLst/>
@@ -7356,8 +8703,8 @@
         </p:blipFill>
         <p:spPr>
           <a:xfrm>
-            <a:off x="7113597" y="2681287"/>
-            <a:ext cx="2383809" cy="1663700"/>
+            <a:off x="6602372" y="3349350"/>
+            <a:ext cx="1671001" cy="1166220"/>
           </a:xfrm>
           <a:prstGeom prst="rect">
             <a:avLst/>
@@ -7386,8 +8733,8 @@
         </p:blipFill>
         <p:spPr>
           <a:xfrm>
-            <a:off x="2944274" y="4992687"/>
-            <a:ext cx="1662881" cy="1171575"/>
+            <a:off x="8606522" y="3418788"/>
+            <a:ext cx="1597805" cy="1125726"/>
           </a:xfrm>
           <a:prstGeom prst="rect">
             <a:avLst/>
@@ -7416,8 +8763,38 @@
         </p:blipFill>
         <p:spPr>
           <a:xfrm>
-            <a:off x="4695805" y="2568830"/>
-            <a:ext cx="1864083" cy="1864083"/>
+            <a:off x="3151007" y="3195320"/>
+            <a:ext cx="1495008" cy="1495008"/>
+          </a:xfrm>
+          <a:prstGeom prst="rect">
+            <a:avLst/>
+          </a:prstGeom>
+        </p:spPr>
+      </p:pic>
+      <p:pic>
+        <p:nvPicPr>
+          <p:cNvPr id="13" name="Image 12"/>
+          <p:cNvPicPr>
+            <a:picLocks noChangeAspect="1"/>
+          </p:cNvPicPr>
+          <p:nvPr/>
+        </p:nvPicPr>
+        <p:blipFill>
+          <a:blip r:embed="rId8">
+            <a:extLst>
+              <a:ext uri="{28A0092B-C50C-407E-A947-70E740481C1C}">
+                <a14:useLocalDpi xmlns:a14="http://schemas.microsoft.com/office/drawing/2010/main" val="0"/>
+              </a:ext>
+            </a:extLst>
+          </a:blip>
+          <a:stretch>
+            <a:fillRect/>
+          </a:stretch>
+        </p:blipFill>
+        <p:spPr>
+          <a:xfrm>
+            <a:off x="10173376" y="317398"/>
+            <a:ext cx="1713838" cy="1497955"/>
           </a:xfrm>
           <a:prstGeom prst="rect">
             <a:avLst/>
@@ -7434,6 +8811,18 @@
   <p:clrMapOvr>
     <a:masterClrMapping/>
   </p:clrMapOvr>
+  <mc:AlternateContent xmlns:mc="http://schemas.openxmlformats.org/markup-compatibility/2006">
+    <mc:Choice xmlns:p14="http://schemas.microsoft.com/office/powerpoint/2010/main" Requires="p14">
+      <p:transition spd="slow" p14:dur="1300">
+        <p14:pan dir="u"/>
+      </p:transition>
+    </mc:Choice>
+    <mc:Fallback>
+      <p:transition spd="slow">
+        <p:fade/>
+      </p:transition>
+    </mc:Fallback>
+  </mc:AlternateContent>
   <p:timing>
     <p:tnLst>
       <p:par>
@@ -7473,8 +8862,8 @@
         </p:nvSpPr>
         <p:spPr>
           <a:xfrm>
-            <a:off x="1928812" y="778932"/>
-            <a:ext cx="8534400" cy="1507067"/>
+            <a:off x="0" y="201706"/>
+            <a:ext cx="12192000" cy="1507067"/>
           </a:xfrm>
         </p:spPr>
         <p:txBody>
@@ -7508,46 +8897,97 @@
         </p:spPr>
         <p:txBody>
           <a:bodyPr anchor="t">
-            <a:normAutofit/>
+            <a:normAutofit lnSpcReduction="10000"/>
           </a:bodyPr>
           <a:lstStyle/>
           <a:p>
             <a:r>
-              <a:rPr lang="fr-FR" dirty="0" smtClean="0"/>
-              <a:t>Présentation des fonctionnalités l’application</a:t>
-            </a:r>
-          </a:p>
-          <a:p>
-            <a:endParaRPr lang="fr-FR" dirty="0" smtClean="0"/>
-          </a:p>
-          <a:p>
-            <a:r>
-              <a:rPr lang="fr-FR" dirty="0" smtClean="0"/>
-              <a:t>Améliorations </a:t>
-            </a:r>
-            <a:r>
-              <a:rPr lang="fr-FR" dirty="0" smtClean="0"/>
-              <a:t>à apporter</a:t>
-            </a:r>
-            <a:endParaRPr lang="fr-FR" dirty="0" smtClean="0"/>
-          </a:p>
-          <a:p>
-            <a:endParaRPr lang="fr-FR" dirty="0"/>
-          </a:p>
-          <a:p>
-            <a:r>
-              <a:rPr lang="fr-FR" dirty="0" smtClean="0"/>
-              <a:t>Difficultés rencontrées</a:t>
-            </a:r>
-          </a:p>
-          <a:p>
-            <a:endParaRPr lang="fr-FR" dirty="0"/>
-          </a:p>
-          <a:p>
-            <a:r>
-              <a:rPr lang="fr-FR" dirty="0" smtClean="0"/>
-              <a:t>Bilan du projet</a:t>
-            </a:r>
+              <a:rPr lang="fr-FR" sz="2400" dirty="0" smtClean="0">
+                <a:solidFill>
+                  <a:schemeClr val="tx1"/>
+                </a:solidFill>
+              </a:rPr>
+              <a:t>Application </a:t>
+            </a:r>
+            <a:r>
+              <a:rPr lang="fr-FR" sz="2400" dirty="0" err="1" smtClean="0">
+                <a:solidFill>
+                  <a:schemeClr val="tx1"/>
+                </a:solidFill>
+              </a:rPr>
+              <a:t>features</a:t>
+            </a:r>
+            <a:endParaRPr lang="fr-FR" sz="2400" dirty="0" smtClean="0">
+              <a:solidFill>
+                <a:schemeClr val="tx1"/>
+              </a:solidFill>
+            </a:endParaRPr>
+          </a:p>
+          <a:p>
+            <a:endParaRPr lang="fr-FR" sz="2400" dirty="0" smtClean="0">
+              <a:solidFill>
+                <a:schemeClr val="tx1"/>
+              </a:solidFill>
+            </a:endParaRPr>
+          </a:p>
+          <a:p>
+            <a:r>
+              <a:rPr lang="fr-FR" sz="2400" dirty="0" err="1" smtClean="0">
+                <a:solidFill>
+                  <a:schemeClr val="tx1"/>
+                </a:solidFill>
+              </a:rPr>
+              <a:t>Improvements</a:t>
+            </a:r>
+            <a:endParaRPr lang="fr-FR" sz="2400" dirty="0" smtClean="0">
+              <a:solidFill>
+                <a:schemeClr val="tx1"/>
+              </a:solidFill>
+            </a:endParaRPr>
+          </a:p>
+          <a:p>
+            <a:endParaRPr lang="fr-FR" sz="2400" dirty="0">
+              <a:solidFill>
+                <a:schemeClr val="tx1"/>
+              </a:solidFill>
+            </a:endParaRPr>
+          </a:p>
+          <a:p>
+            <a:r>
+              <a:rPr lang="fr-FR" sz="2400" dirty="0" err="1" smtClean="0">
+                <a:solidFill>
+                  <a:schemeClr val="tx1"/>
+                </a:solidFill>
+              </a:rPr>
+              <a:t>Difficulties</a:t>
+            </a:r>
+            <a:endParaRPr lang="fr-FR" sz="2400" dirty="0" smtClean="0">
+              <a:solidFill>
+                <a:schemeClr val="tx1"/>
+              </a:solidFill>
+            </a:endParaRPr>
+          </a:p>
+          <a:p>
+            <a:endParaRPr lang="fr-FR" sz="2400" dirty="0">
+              <a:solidFill>
+                <a:schemeClr val="tx1"/>
+              </a:solidFill>
+            </a:endParaRPr>
+          </a:p>
+          <a:p>
+            <a:r>
+              <a:rPr lang="fr-FR" sz="2400" dirty="0" err="1" smtClean="0">
+                <a:solidFill>
+                  <a:schemeClr val="tx1"/>
+                </a:solidFill>
+              </a:rPr>
+              <a:t>Results</a:t>
+            </a:r>
+            <a:endParaRPr lang="fr-FR" sz="2400" dirty="0" smtClean="0">
+              <a:solidFill>
+                <a:schemeClr val="tx1"/>
+              </a:solidFill>
+            </a:endParaRPr>
           </a:p>
           <a:p>
             <a:endParaRPr lang="fr-FR" dirty="0"/>
@@ -7580,6 +9020,36 @@
           </a:p>
         </p:txBody>
       </p:sp>
+      <p:pic>
+        <p:nvPicPr>
+          <p:cNvPr id="6" name="Image 5"/>
+          <p:cNvPicPr>
+            <a:picLocks noChangeAspect="1"/>
+          </p:cNvPicPr>
+          <p:nvPr/>
+        </p:nvPicPr>
+        <p:blipFill>
+          <a:blip r:embed="rId2">
+            <a:extLst>
+              <a:ext uri="{28A0092B-C50C-407E-A947-70E740481C1C}">
+                <a14:useLocalDpi xmlns:a14="http://schemas.microsoft.com/office/drawing/2010/main" val="0"/>
+              </a:ext>
+            </a:extLst>
+          </a:blip>
+          <a:stretch>
+            <a:fillRect/>
+          </a:stretch>
+        </p:blipFill>
+        <p:spPr>
+          <a:xfrm>
+            <a:off x="10173376" y="317398"/>
+            <a:ext cx="1713838" cy="1497955"/>
+          </a:xfrm>
+          <a:prstGeom prst="rect">
+            <a:avLst/>
+          </a:prstGeom>
+        </p:spPr>
+      </p:pic>
     </p:spTree>
     <p:extLst>
       <p:ext uri="{BB962C8B-B14F-4D97-AF65-F5344CB8AC3E}">
@@ -7590,6 +9060,18 @@
   <p:clrMapOvr>
     <a:masterClrMapping/>
   </p:clrMapOvr>
+  <mc:AlternateContent xmlns:mc="http://schemas.openxmlformats.org/markup-compatibility/2006">
+    <mc:Choice xmlns:p14="http://schemas.microsoft.com/office/powerpoint/2010/main" Requires="p14">
+      <p:transition spd="slow" p14:dur="1500">
+        <p14:window dir="vert"/>
+      </p:transition>
+    </mc:Choice>
+    <mc:Fallback>
+      <p:transition spd="slow">
+        <p:fade/>
+      </p:transition>
+    </mc:Fallback>
+  </mc:AlternateContent>
   <p:timing>
     <p:tnLst>
       <p:par>
@@ -7629,7 +9111,7 @@
         </p:nvSpPr>
         <p:spPr>
           <a:xfrm>
-            <a:off x="684212" y="0"/>
+            <a:off x="1509712" y="182032"/>
             <a:ext cx="8534400" cy="1507067"/>
           </a:xfrm>
         </p:spPr>
@@ -7637,9 +9119,14 @@
           <a:bodyPr/>
           <a:lstStyle/>
           <a:p>
+            <a:pPr algn="ctr"/>
             <a:r>
               <a:rPr lang="fr-FR" dirty="0" smtClean="0"/>
-              <a:t>Intro</a:t>
+              <a:t>operating </a:t>
+            </a:r>
+            <a:r>
+              <a:rPr lang="fr-FR" dirty="0"/>
+              <a:t>of the application</a:t>
             </a:r>
             <a:endParaRPr lang="fr-FR" dirty="0"/>
           </a:p>
@@ -7657,202 +9144,133 @@
         </p:nvSpPr>
         <p:spPr>
           <a:xfrm>
-            <a:off x="684212" y="1968500"/>
+            <a:off x="1255712" y="1955800"/>
             <a:ext cx="8534400" cy="3615267"/>
           </a:xfrm>
         </p:spPr>
         <p:txBody>
-          <a:bodyPr>
-            <a:normAutofit fontScale="85000" lnSpcReduction="20000"/>
+          <a:bodyPr anchor="t">
+            <a:normAutofit/>
           </a:bodyPr>
           <a:lstStyle/>
           <a:p>
-            <a:r>
-              <a:rPr lang="fr-FR" dirty="0" smtClean="0"/>
-              <a:t>Quel est le but de cette application ?</a:t>
-            </a:r>
-          </a:p>
-          <a:p>
-            <a:r>
-              <a:rPr lang="fr-FR" altLang="fr-FR" dirty="0" err="1" smtClean="0">
-                <a:solidFill>
-                  <a:srgbClr val="212121"/>
-                </a:solidFill>
-                <a:latin typeface="inherit"/>
+            <a:pPr marL="0" indent="0">
+              <a:buNone/>
+            </a:pPr>
+            <a:r>
+              <a:rPr lang="fr-FR" dirty="0" smtClean="0">
+                <a:solidFill>
+                  <a:schemeClr val="tx1"/>
+                </a:solidFill>
               </a:rPr>
-              <a:t>What</a:t>
-            </a:r>
-            <a:r>
-              <a:rPr lang="fr-FR" altLang="fr-FR" dirty="0" smtClean="0">
-                <a:solidFill>
-                  <a:srgbClr val="212121"/>
-                </a:solidFill>
-                <a:latin typeface="inherit"/>
+              <a:t>3 </a:t>
+            </a:r>
+            <a:r>
+              <a:rPr lang="fr-FR" dirty="0" err="1" smtClean="0">
+                <a:solidFill>
+                  <a:schemeClr val="tx1"/>
+                </a:solidFill>
               </a:rPr>
-              <a:t> </a:t>
-            </a:r>
-            <a:r>
-              <a:rPr lang="fr-FR" altLang="fr-FR" dirty="0" err="1">
-                <a:solidFill>
-                  <a:srgbClr val="212121"/>
-                </a:solidFill>
-                <a:latin typeface="inherit"/>
+              <a:t>levels</a:t>
+            </a:r>
+            <a:r>
+              <a:rPr lang="fr-FR" dirty="0" smtClean="0">
+                <a:solidFill>
+                  <a:schemeClr val="tx1"/>
+                </a:solidFill>
               </a:rPr>
-              <a:t>is</a:t>
-            </a:r>
-            <a:r>
-              <a:rPr lang="fr-FR" altLang="fr-FR" dirty="0">
-                <a:solidFill>
-                  <a:srgbClr val="212121"/>
-                </a:solidFill>
-                <a:latin typeface="inherit"/>
-              </a:rPr>
-              <a:t> the </a:t>
-            </a:r>
-            <a:r>
-              <a:rPr lang="fr-FR" altLang="fr-FR" dirty="0" err="1">
-                <a:solidFill>
-                  <a:srgbClr val="212121"/>
-                </a:solidFill>
-                <a:latin typeface="inherit"/>
-              </a:rPr>
-              <a:t>purpose</a:t>
-            </a:r>
-            <a:r>
-              <a:rPr lang="fr-FR" altLang="fr-FR" dirty="0">
-                <a:solidFill>
-                  <a:srgbClr val="212121"/>
-                </a:solidFill>
-                <a:latin typeface="inherit"/>
-              </a:rPr>
-              <a:t> of </a:t>
-            </a:r>
-            <a:r>
-              <a:rPr lang="fr-FR" altLang="fr-FR" dirty="0" err="1">
-                <a:solidFill>
-                  <a:srgbClr val="212121"/>
-                </a:solidFill>
-                <a:latin typeface="inherit"/>
-              </a:rPr>
-              <a:t>this</a:t>
-            </a:r>
-            <a:r>
-              <a:rPr lang="fr-FR" altLang="fr-FR" dirty="0">
-                <a:solidFill>
-                  <a:srgbClr val="212121"/>
-                </a:solidFill>
-                <a:latin typeface="inherit"/>
-              </a:rPr>
-              <a:t> application?</a:t>
-            </a:r>
-            <a:r>
-              <a:rPr lang="fr-FR" altLang="fr-FR" sz="1050" dirty="0">
-                <a:solidFill>
-                  <a:schemeClr val="tx1"/>
-                </a:solidFill>
-              </a:rPr>
-              <a:t> </a:t>
-            </a:r>
-            <a:endParaRPr lang="fr-FR" altLang="fr-FR" sz="1600" dirty="0">
+              <a:t>:</a:t>
+            </a:r>
+            <a:endParaRPr lang="fr-FR" dirty="0">
               <a:solidFill>
                 <a:schemeClr val="tx1"/>
               </a:solidFill>
-              <a:latin typeface="Arial" panose="020B0604020202020204" pitchFamily="34" charset="0"/>
             </a:endParaRPr>
           </a:p>
           <a:p>
+            <a:r>
+              <a:rPr lang="fr-FR" dirty="0" err="1" smtClean="0">
+                <a:solidFill>
+                  <a:schemeClr val="tx1"/>
+                </a:solidFill>
+              </a:rPr>
+              <a:t>Visitor</a:t>
+            </a:r>
+            <a:endParaRPr lang="fr-FR" dirty="0" smtClean="0">
+              <a:solidFill>
+                <a:schemeClr val="tx1"/>
+              </a:solidFill>
+            </a:endParaRPr>
+          </a:p>
+          <a:p>
+            <a:endParaRPr lang="fr-FR" dirty="0" smtClean="0">
+              <a:solidFill>
+                <a:schemeClr val="tx1"/>
+              </a:solidFill>
+            </a:endParaRPr>
+          </a:p>
+          <a:p>
             <a:pPr marL="0" indent="0">
               <a:buNone/>
             </a:pPr>
-            <a:endParaRPr lang="fr-FR" dirty="0" smtClean="0"/>
-          </a:p>
-          <a:p>
-            <a:r>
-              <a:rPr lang="fr-FR" dirty="0" smtClean="0"/>
-              <a:t>A qui s’adresse l’application ?</a:t>
-            </a:r>
-          </a:p>
-          <a:p>
-            <a:r>
-              <a:rPr lang="en-US" dirty="0">
-                <a:solidFill>
-                  <a:schemeClr val="bg1"/>
+            <a:endParaRPr lang="fr-FR" dirty="0" smtClean="0">
+              <a:solidFill>
+                <a:schemeClr val="tx1"/>
+              </a:solidFill>
+            </a:endParaRPr>
+          </a:p>
+          <a:p>
+            <a:r>
+              <a:rPr lang="fr-FR" dirty="0" err="1" smtClean="0">
+                <a:solidFill>
+                  <a:schemeClr val="tx1"/>
                 </a:solidFill>
               </a:rPr>
-              <a:t>for whom is this application</a:t>
-            </a:r>
-            <a:r>
-              <a:rPr lang="en-US" dirty="0" smtClean="0">
-                <a:solidFill>
-                  <a:schemeClr val="bg1"/>
+              <a:t>Member</a:t>
+            </a:r>
+            <a:endParaRPr lang="fr-FR" dirty="0" smtClean="0">
+              <a:solidFill>
+                <a:schemeClr val="tx1"/>
+              </a:solidFill>
+            </a:endParaRPr>
+          </a:p>
+          <a:p>
+            <a:pPr marL="0" indent="0">
+              <a:buNone/>
+            </a:pPr>
+            <a:endParaRPr lang="fr-FR" dirty="0" smtClean="0">
+              <a:solidFill>
+                <a:schemeClr val="tx1"/>
+              </a:solidFill>
+            </a:endParaRPr>
+          </a:p>
+          <a:p>
+            <a:endParaRPr lang="fr-FR" dirty="0" smtClean="0">
+              <a:solidFill>
+                <a:schemeClr val="tx1"/>
+              </a:solidFill>
+            </a:endParaRPr>
+          </a:p>
+          <a:p>
+            <a:r>
+              <a:rPr lang="fr-FR" dirty="0" err="1" smtClean="0">
+                <a:solidFill>
+                  <a:schemeClr val="tx1"/>
                 </a:solidFill>
               </a:rPr>
-              <a:t>?</a:t>
-            </a:r>
-          </a:p>
-          <a:p>
-            <a:endParaRPr lang="fr-FR" dirty="0" smtClean="0"/>
-          </a:p>
-          <a:p>
-            <a:r>
-              <a:rPr lang="fr-FR" dirty="0" smtClean="0"/>
-              <a:t>Pourquoi cette application ?</a:t>
-            </a:r>
-          </a:p>
-          <a:p>
-            <a:r>
-              <a:rPr lang="fr-FR" dirty="0" err="1" smtClean="0">
-                <a:solidFill>
-                  <a:schemeClr val="bg1"/>
-                </a:solidFill>
-              </a:rPr>
-              <a:t>Why</a:t>
-            </a:r>
-            <a:r>
-              <a:rPr lang="fr-FR" dirty="0" smtClean="0">
-                <a:solidFill>
-                  <a:schemeClr val="bg1"/>
-                </a:solidFill>
-              </a:rPr>
-              <a:t> </a:t>
-            </a:r>
-            <a:r>
-              <a:rPr lang="fr-FR" dirty="0" err="1" smtClean="0">
-                <a:solidFill>
-                  <a:schemeClr val="bg1"/>
-                </a:solidFill>
-              </a:rPr>
-              <a:t>this</a:t>
-            </a:r>
-            <a:r>
-              <a:rPr lang="fr-FR" dirty="0" smtClean="0">
-                <a:solidFill>
-                  <a:schemeClr val="bg1"/>
-                </a:solidFill>
-              </a:rPr>
-              <a:t> application ?</a:t>
-            </a:r>
-          </a:p>
-          <a:p>
-            <a:pPr marL="0" indent="0">
-              <a:buNone/>
-            </a:pPr>
-            <a:endParaRPr lang="fr-FR" dirty="0" smtClean="0"/>
-          </a:p>
-          <a:p>
-            <a:r>
-              <a:rPr lang="fr-FR" dirty="0" smtClean="0"/>
-              <a:t>Comment sera elle utilisée ?</a:t>
-            </a:r>
-          </a:p>
-          <a:p>
-            <a:endParaRPr lang="fr-FR" dirty="0"/>
-          </a:p>
-        </p:txBody>
-      </p:sp>
-      <p:sp>
-        <p:nvSpPr>
-          <p:cNvPr id="6" name="Espace réservé du numéro de diapositive 5"/>
+              <a:t>Administrator</a:t>
+            </a:r>
+            <a:endParaRPr lang="fr-FR" dirty="0" smtClean="0">
+              <a:solidFill>
+                <a:schemeClr val="tx1"/>
+              </a:solidFill>
+            </a:endParaRPr>
+          </a:p>
+        </p:txBody>
+      </p:sp>
+      <p:sp>
+        <p:nvSpPr>
+          <p:cNvPr id="4" name="Espace réservé du numéro de diapositive 3"/>
           <p:cNvSpPr>
             <a:spLocks noGrp="1"/>
           </p:cNvSpPr>
@@ -7873,99 +9291,127 @@
           </a:p>
         </p:txBody>
       </p:sp>
-      <p:sp>
-        <p:nvSpPr>
-          <p:cNvPr id="5" name="Rectangle 2"/>
-          <p:cNvSpPr>
-            <a:spLocks noChangeArrowheads="1"/>
-          </p:cNvSpPr>
+      <p:pic>
+        <p:nvPicPr>
+          <p:cNvPr id="6" name="Image 5"/>
+          <p:cNvPicPr>
+            <a:picLocks noChangeAspect="1"/>
+          </p:cNvPicPr>
           <p:nvPr/>
-        </p:nvSpPr>
-        <p:spPr bwMode="auto">
-          <a:xfrm>
-            <a:off x="0" y="90100"/>
-            <a:ext cx="65" cy="276999"/>
+        </p:nvPicPr>
+        <p:blipFill rotWithShape="1">
+          <a:blip r:embed="rId2"/>
+          <a:srcRect l="7539" t="12673" r="7541" b="72396"/>
+          <a:stretch/>
+        </p:blipFill>
+        <p:spPr>
+          <a:xfrm>
+            <a:off x="1317624" y="2780490"/>
+            <a:ext cx="8053388" cy="796082"/>
           </a:xfrm>
           <a:prstGeom prst="rect">
             <a:avLst/>
           </a:prstGeom>
-          <a:solidFill>
-            <a:srgbClr val="FFFFFF"/>
-          </a:solidFill>
-          <a:ln>
-            <a:noFill/>
-          </a:ln>
-          <a:effectLst/>
-          <a:extLst>
-            <a:ext uri="{91240B29-F687-4F45-9708-019B960494DF}">
-              <a14:hiddenLine xmlns:a14="http://schemas.microsoft.com/office/drawing/2010/main" w="9525">
-                <a:solidFill>
-                  <a:schemeClr val="tx1"/>
-                </a:solidFill>
-                <a:miter lim="800000"/>
-                <a:headEnd/>
-                <a:tailEnd/>
-              </a14:hiddenLine>
-            </a:ext>
-            <a:ext uri="{AF507438-7753-43E0-B8FC-AC1667EBCBE1}">
-              <a14:hiddenEffects xmlns:a14="http://schemas.microsoft.com/office/drawing/2010/main">
-                <a:effectLst>
-                  <a:outerShdw dist="35921" dir="2700000" algn="ctr" rotWithShape="0">
-                    <a:schemeClr val="bg2"/>
-                  </a:outerShdw>
-                </a:effectLst>
-              </a14:hiddenEffects>
-            </a:ext>
-          </a:extLst>
-        </p:spPr>
-        <p:txBody>
-          <a:bodyPr vert="horz" wrap="none" lIns="0" tIns="0" rIns="0" bIns="0" numCol="1" anchor="ctr" anchorCtr="0" compatLnSpc="1">
-            <a:prstTxWarp prst="textNoShape">
-              <a:avLst/>
-            </a:prstTxWarp>
-            <a:spAutoFit/>
-          </a:bodyPr>
-          <a:lstStyle/>
-          <a:p>
-            <a:pPr marL="0" marR="0" lvl="0" indent="0" algn="l" defTabSz="914400" rtl="0" eaLnBrk="0" fontAlgn="base" latinLnBrk="0" hangingPunct="0">
-              <a:lnSpc>
-                <a:spcPct val="100000"/>
-              </a:lnSpc>
-              <a:spcBef>
-                <a:spcPct val="0"/>
-              </a:spcBef>
-              <a:spcAft>
-                <a:spcPct val="0"/>
-              </a:spcAft>
-              <a:buClrTx/>
-              <a:buSzTx/>
-              <a:buFontTx/>
-              <a:buNone/>
-              <a:tabLst/>
-            </a:pPr>
-            <a:endParaRPr kumimoji="0" lang="fr-FR" altLang="fr-FR" sz="1800" b="0" i="0" u="none" strike="noStrike" cap="none" normalizeH="0" baseline="0" dirty="0" smtClean="0">
-              <a:ln>
-                <a:noFill/>
-              </a:ln>
-              <a:solidFill>
-                <a:schemeClr val="tx1"/>
-              </a:solidFill>
-              <a:effectLst/>
-              <a:latin typeface="Arial" panose="020B0604020202020204" pitchFamily="34" charset="0"/>
-            </a:endParaRPr>
-          </a:p>
-        </p:txBody>
-      </p:sp>
+        </p:spPr>
+      </p:pic>
+      <p:pic>
+        <p:nvPicPr>
+          <p:cNvPr id="8" name="Image 7"/>
+          <p:cNvPicPr>
+            <a:picLocks noChangeAspect="1"/>
+          </p:cNvPicPr>
+          <p:nvPr/>
+        </p:nvPicPr>
+        <p:blipFill rotWithShape="1">
+          <a:blip r:embed="rId3"/>
+          <a:srcRect l="7833" t="13021" r="7931" b="73264"/>
+          <a:stretch/>
+        </p:blipFill>
+        <p:spPr>
+          <a:xfrm>
+            <a:off x="1317624" y="4174804"/>
+            <a:ext cx="8053388" cy="737216"/>
+          </a:xfrm>
+          <a:prstGeom prst="rect">
+            <a:avLst/>
+          </a:prstGeom>
+        </p:spPr>
+      </p:pic>
+      <p:pic>
+        <p:nvPicPr>
+          <p:cNvPr id="9" name="Image 8"/>
+          <p:cNvPicPr>
+            <a:picLocks noChangeAspect="1"/>
+          </p:cNvPicPr>
+          <p:nvPr/>
+        </p:nvPicPr>
+        <p:blipFill rotWithShape="1">
+          <a:blip r:embed="rId4"/>
+          <a:srcRect l="8126" t="12848" r="7833" b="72742"/>
+          <a:stretch/>
+        </p:blipFill>
+        <p:spPr>
+          <a:xfrm>
+            <a:off x="1317624" y="5510252"/>
+            <a:ext cx="8053388" cy="776343"/>
+          </a:xfrm>
+          <a:prstGeom prst="rect">
+            <a:avLst/>
+          </a:prstGeom>
+        </p:spPr>
+      </p:pic>
+      <p:pic>
+        <p:nvPicPr>
+          <p:cNvPr id="11" name="Image 10"/>
+          <p:cNvPicPr>
+            <a:picLocks noChangeAspect="1"/>
+          </p:cNvPicPr>
+          <p:nvPr/>
+        </p:nvPicPr>
+        <p:blipFill>
+          <a:blip r:embed="rId5">
+            <a:extLst>
+              <a:ext uri="{28A0092B-C50C-407E-A947-70E740481C1C}">
+                <a14:useLocalDpi xmlns:a14="http://schemas.microsoft.com/office/drawing/2010/main" val="0"/>
+              </a:ext>
+            </a:extLst>
+          </a:blip>
+          <a:stretch>
+            <a:fillRect/>
+          </a:stretch>
+        </p:blipFill>
+        <p:spPr>
+          <a:xfrm>
+            <a:off x="10173376" y="317398"/>
+            <a:ext cx="1713838" cy="1497955"/>
+          </a:xfrm>
+          <a:prstGeom prst="rect">
+            <a:avLst/>
+          </a:prstGeom>
+        </p:spPr>
+      </p:pic>
     </p:spTree>
     <p:extLst>
       <p:ext uri="{BB962C8B-B14F-4D97-AF65-F5344CB8AC3E}">
-        <p14:creationId xmlns:p14="http://schemas.microsoft.com/office/powerpoint/2010/main" val="1991569012"/>
+        <p14:creationId xmlns:p14="http://schemas.microsoft.com/office/powerpoint/2010/main" val="3171969531"/>
       </p:ext>
     </p:extLst>
   </p:cSld>
   <p:clrMapOvr>
     <a:masterClrMapping/>
   </p:clrMapOvr>
+  <mc:AlternateContent xmlns:mc="http://schemas.openxmlformats.org/markup-compatibility/2006">
+    <mc:Choice xmlns:p14="http://schemas.microsoft.com/office/powerpoint/2010/main" Requires="p14">
+      <p:transition spd="slow" p14:dur="1600">
+        <p14:conveyor dir="l"/>
+      </p:transition>
+    </mc:Choice>
+    <mc:Fallback>
+      <p:transition spd="slow">
+        <p:fade/>
+      </p:transition>
+    </mc:Fallback>
+  </mc:AlternateContent>
   <p:timing>
     <p:tnLst>
       <p:par>
@@ -8005,8 +9451,8 @@
         </p:nvSpPr>
         <p:spPr>
           <a:xfrm>
-            <a:off x="1509712" y="182032"/>
-            <a:ext cx="8534400" cy="1507067"/>
+            <a:off x="0" y="317398"/>
+            <a:ext cx="12192000" cy="1021976"/>
           </a:xfrm>
         </p:spPr>
         <p:txBody>
@@ -8016,81 +9462,37 @@
             <a:pPr algn="ctr"/>
             <a:r>
               <a:rPr lang="fr-FR" dirty="0" smtClean="0"/>
-              <a:t>Le fonctionnement de l’application</a:t>
-            </a:r>
-            <a:endParaRPr lang="fr-FR" dirty="0"/>
-          </a:p>
-        </p:txBody>
-      </p:sp>
-      <p:sp>
-        <p:nvSpPr>
-          <p:cNvPr id="3" name="Espace réservé du contenu 2"/>
-          <p:cNvSpPr>
-            <a:spLocks noGrp="1"/>
-          </p:cNvSpPr>
+              <a:t>Home page</a:t>
+            </a:r>
+            <a:endParaRPr lang="en-US" dirty="0"/>
+          </a:p>
+        </p:txBody>
+      </p:sp>
+      <p:pic>
+        <p:nvPicPr>
+          <p:cNvPr id="5" name="Espace réservé du contenu 4"/>
+          <p:cNvPicPr>
+            <a:picLocks noGrp="1" noChangeAspect="1"/>
+          </p:cNvPicPr>
           <p:nvPr>
             <p:ph idx="1"/>
           </p:nvPr>
-        </p:nvSpPr>
-        <p:spPr>
-          <a:xfrm>
-            <a:off x="1255712" y="1955800"/>
-            <a:ext cx="8534400" cy="3615267"/>
-          </a:xfrm>
-        </p:spPr>
-        <p:txBody>
-          <a:bodyPr anchor="t">
-            <a:normAutofit/>
-          </a:bodyPr>
-          <a:lstStyle/>
-          <a:p>
-            <a:pPr marL="0" indent="0">
-              <a:buNone/>
-            </a:pPr>
-            <a:r>
-              <a:rPr lang="fr-FR" dirty="0" smtClean="0"/>
-              <a:t>L’application fonctionne sous 3 niveaux:</a:t>
-            </a:r>
-            <a:endParaRPr lang="fr-FR" dirty="0"/>
-          </a:p>
-          <a:p>
-            <a:r>
-              <a:rPr lang="fr-FR" dirty="0" smtClean="0"/>
-              <a:t>Visiteur</a:t>
-            </a:r>
-          </a:p>
-          <a:p>
-            <a:endParaRPr lang="fr-FR" dirty="0" smtClean="0"/>
-          </a:p>
-          <a:p>
-            <a:pPr marL="0" indent="0">
-              <a:buNone/>
-            </a:pPr>
-            <a:endParaRPr lang="fr-FR" dirty="0" smtClean="0"/>
-          </a:p>
-          <a:p>
-            <a:r>
-              <a:rPr lang="fr-FR" dirty="0" smtClean="0"/>
-              <a:t>Membre</a:t>
-            </a:r>
-          </a:p>
-          <a:p>
-            <a:pPr marL="0" indent="0">
-              <a:buNone/>
-            </a:pPr>
-            <a:endParaRPr lang="fr-FR" dirty="0" smtClean="0"/>
-          </a:p>
-          <a:p>
-            <a:endParaRPr lang="fr-FR" dirty="0" smtClean="0"/>
-          </a:p>
-          <a:p>
-            <a:r>
-              <a:rPr lang="fr-FR" dirty="0" smtClean="0"/>
-              <a:t>Administrateur</a:t>
-            </a:r>
-          </a:p>
-        </p:txBody>
-      </p:sp>
+        </p:nvPicPr>
+        <p:blipFill rotWithShape="1">
+          <a:blip r:embed="rId2"/>
+          <a:srcRect l="6693" t="10859" r="7114" b="16841"/>
+          <a:stretch/>
+        </p:blipFill>
+        <p:spPr>
+          <a:xfrm>
+            <a:off x="1392338" y="1632536"/>
+            <a:ext cx="7745647" cy="3652777"/>
+          </a:xfrm>
+          <a:prstGeom prst="rect">
+            <a:avLst/>
+          </a:prstGeom>
+        </p:spPr>
+      </p:pic>
       <p:sp>
         <p:nvSpPr>
           <p:cNvPr id="4" name="Espace réservé du numéro de diapositive 3"/>
@@ -8114,29 +9516,41 @@
           </a:p>
         </p:txBody>
       </p:sp>
-      <p:pic>
-        <p:nvPicPr>
-          <p:cNvPr id="6" name="Image 5"/>
-          <p:cNvPicPr>
-            <a:picLocks noChangeAspect="1"/>
-          </p:cNvPicPr>
+      <p:sp>
+        <p:nvSpPr>
+          <p:cNvPr id="6" name="ZoneTexte 5"/>
+          <p:cNvSpPr txBox="1"/>
           <p:nvPr/>
-        </p:nvPicPr>
-        <p:blipFill rotWithShape="1">
-          <a:blip r:embed="rId2"/>
-          <a:srcRect l="7539" t="12673" r="7541" b="72396"/>
-          <a:stretch/>
-        </p:blipFill>
-        <p:spPr>
-          <a:xfrm>
-            <a:off x="1317624" y="2780490"/>
-            <a:ext cx="8053388" cy="796082"/>
+        </p:nvSpPr>
+        <p:spPr>
+          <a:xfrm>
+            <a:off x="1392338" y="5285313"/>
+            <a:ext cx="7156256" cy="646331"/>
           </a:xfrm>
           <a:prstGeom prst="rect">
             <a:avLst/>
           </a:prstGeom>
-        </p:spPr>
-      </p:pic>
+          <a:noFill/>
+        </p:spPr>
+        <p:txBody>
+          <a:bodyPr wrap="square" rtlCol="0">
+            <a:spAutoFit/>
+          </a:bodyPr>
+          <a:lstStyle/>
+          <a:p>
+            <a:pPr algn="just"/>
+            <a:r>
+              <a:rPr lang="en-US" dirty="0"/>
+              <a:t>The home page is in the form of a calendar showing all tasks for the selected </a:t>
+            </a:r>
+            <a:r>
+              <a:rPr lang="en-US" dirty="0" smtClean="0"/>
+              <a:t>month.</a:t>
+            </a:r>
+            <a:endParaRPr lang="en-US" dirty="0"/>
+          </a:p>
+        </p:txBody>
+      </p:sp>
       <p:pic>
         <p:nvPicPr>
           <p:cNvPr id="8" name="Image 7"/>
@@ -8145,38 +9559,22 @@
           </p:cNvPicPr>
           <p:nvPr/>
         </p:nvPicPr>
-        <p:blipFill rotWithShape="1">
-          <a:blip r:embed="rId3"/>
-          <a:srcRect l="7833" t="13021" r="7931" b="73264"/>
-          <a:stretch/>
+        <p:blipFill>
+          <a:blip r:embed="rId3">
+            <a:extLst>
+              <a:ext uri="{28A0092B-C50C-407E-A947-70E740481C1C}">
+                <a14:useLocalDpi xmlns:a14="http://schemas.microsoft.com/office/drawing/2010/main" val="0"/>
+              </a:ext>
+            </a:extLst>
+          </a:blip>
+          <a:stretch>
+            <a:fillRect/>
+          </a:stretch>
         </p:blipFill>
         <p:spPr>
           <a:xfrm>
-            <a:off x="1317624" y="4174804"/>
-            <a:ext cx="8053388" cy="737216"/>
-          </a:xfrm>
-          <a:prstGeom prst="rect">
-            <a:avLst/>
-          </a:prstGeom>
-        </p:spPr>
-      </p:pic>
-      <p:pic>
-        <p:nvPicPr>
-          <p:cNvPr id="9" name="Image 8"/>
-          <p:cNvPicPr>
-            <a:picLocks noChangeAspect="1"/>
-          </p:cNvPicPr>
-          <p:nvPr/>
-        </p:nvPicPr>
-        <p:blipFill rotWithShape="1">
-          <a:blip r:embed="rId4"/>
-          <a:srcRect l="8126" t="12848" r="7833" b="72742"/>
-          <a:stretch/>
-        </p:blipFill>
-        <p:spPr>
-          <a:xfrm>
-            <a:off x="1317624" y="5510252"/>
-            <a:ext cx="8053388" cy="776343"/>
+            <a:off x="10173376" y="317398"/>
+            <a:ext cx="1713838" cy="1497955"/>
           </a:xfrm>
           <a:prstGeom prst="rect">
             <a:avLst/>
@@ -8186,13 +9584,25 @@
     </p:spTree>
     <p:extLst>
       <p:ext uri="{BB962C8B-B14F-4D97-AF65-F5344CB8AC3E}">
-        <p14:creationId xmlns:p14="http://schemas.microsoft.com/office/powerpoint/2010/main" val="3171969531"/>
+        <p14:creationId xmlns:p14="http://schemas.microsoft.com/office/powerpoint/2010/main" val="77786047"/>
       </p:ext>
     </p:extLst>
   </p:cSld>
   <p:clrMapOvr>
     <a:masterClrMapping/>
   </p:clrMapOvr>
+  <mc:AlternateContent xmlns:mc="http://schemas.openxmlformats.org/markup-compatibility/2006">
+    <mc:Choice xmlns:p14="http://schemas.microsoft.com/office/powerpoint/2010/main" Requires="p14">
+      <p:transition spd="slow" p14:dur="2000">
+        <p14:ferris dir="l"/>
+      </p:transition>
+    </mc:Choice>
+    <mc:Fallback>
+      <p:transition spd="slow">
+        <p:fade/>
+      </p:transition>
+    </mc:Fallback>
+  </mc:AlternateContent>
   <p:timing>
     <p:tnLst>
       <p:par>
@@ -8222,7 +9632,7 @@
       </p:grpSpPr>
       <p:sp>
         <p:nvSpPr>
-          <p:cNvPr id="2" name="Titre 1"/>
+          <p:cNvPr id="7" name="Titre 6"/>
           <p:cNvSpPr>
             <a:spLocks noGrp="1"/>
           </p:cNvSpPr>
@@ -8232,8 +9642,8 @@
         </p:nvSpPr>
         <p:spPr>
           <a:xfrm>
-            <a:off x="1204912" y="685800"/>
-            <a:ext cx="8534400" cy="1507067"/>
+            <a:off x="0" y="1"/>
+            <a:ext cx="12192000" cy="1021976"/>
           </a:xfrm>
         </p:spPr>
         <p:txBody>
@@ -8242,70 +9652,106 @@
           <a:p>
             <a:pPr algn="ctr"/>
             <a:r>
-              <a:rPr lang="fr-FR" dirty="0" smtClean="0"/>
-              <a:t>La page d’accueil</a:t>
+              <a:rPr lang="en-US" dirty="0" smtClean="0"/>
+              <a:t>Registration</a:t>
             </a:r>
             <a:endParaRPr lang="en-US" dirty="0"/>
+          </a:p>
+        </p:txBody>
+      </p:sp>
+      <p:sp>
+        <p:nvSpPr>
+          <p:cNvPr id="4" name="Espace réservé du numéro de diapositive 3"/>
+          <p:cNvSpPr>
+            <a:spLocks noGrp="1"/>
+          </p:cNvSpPr>
+          <p:nvPr>
+            <p:ph type="sldNum" sz="quarter" idx="12"/>
+          </p:nvPr>
+        </p:nvSpPr>
+        <p:spPr/>
+        <p:txBody>
+          <a:bodyPr/>
+          <a:lstStyle/>
+          <a:p>
+            <a:fld id="{329D2A3D-7777-43B9-862C-AF2C35877681}" type="slidenum">
+              <a:rPr lang="fr-FR" smtClean="0"/>
+              <a:t>7</a:t>
+            </a:fld>
+            <a:endParaRPr lang="fr-FR"/>
           </a:p>
         </p:txBody>
       </p:sp>
       <p:pic>
         <p:nvPicPr>
-          <p:cNvPr id="5" name="Espace réservé du contenu 4"/>
+          <p:cNvPr id="5" name="Image 4"/>
           <p:cNvPicPr>
-            <a:picLocks noGrp="1" noChangeAspect="1"/>
+            <a:picLocks noChangeAspect="1"/>
           </p:cNvPicPr>
-          <p:nvPr>
-            <p:ph idx="1"/>
-          </p:nvPr>
+          <p:nvPr/>
         </p:nvPicPr>
-        <p:blipFill rotWithShape="1">
-          <a:blip r:embed="rId2"/>
-          <a:stretch/>
+        <p:blipFill>
+          <a:blip r:embed="rId2">
+            <a:extLst>
+              <a:ext uri="{28A0092B-C50C-407E-A947-70E740481C1C}">
+                <a14:useLocalDpi xmlns:a14="http://schemas.microsoft.com/office/drawing/2010/main" val="0"/>
+              </a:ext>
+            </a:extLst>
+          </a:blip>
+          <a:stretch>
+            <a:fillRect/>
+          </a:stretch>
         </p:blipFill>
         <p:spPr>
           <a:xfrm>
-            <a:off x="1736744" y="685800"/>
-            <a:ext cx="6429338" cy="3614738"/>
+            <a:off x="1130479" y="1094690"/>
+            <a:ext cx="7742244" cy="4087905"/>
           </a:xfrm>
           <a:prstGeom prst="rect">
             <a:avLst/>
           </a:prstGeom>
         </p:spPr>
       </p:pic>
-      <p:sp>
-        <p:nvSpPr>
-          <p:cNvPr id="4" name="Espace réservé du numéro de diapositive 3"/>
-          <p:cNvSpPr>
-            <a:spLocks noGrp="1"/>
-          </p:cNvSpPr>
-          <p:nvPr>
-            <p:ph type="sldNum" sz="quarter" idx="12"/>
-          </p:nvPr>
-        </p:nvSpPr>
-        <p:spPr/>
-        <p:txBody>
-          <a:bodyPr/>
-          <a:lstStyle/>
-          <a:p>
-            <a:fld id="{329D2A3D-7777-43B9-862C-AF2C35877681}" type="slidenum">
-              <a:rPr lang="fr-FR" smtClean="0"/>
-              <a:t>7</a:t>
-            </a:fld>
-            <a:endParaRPr lang="fr-FR"/>
-          </a:p>
-        </p:txBody>
-      </p:sp>
-      <p:sp>
-        <p:nvSpPr>
-          <p:cNvPr id="6" name="ZoneTexte 5"/>
+      <p:pic>
+        <p:nvPicPr>
+          <p:cNvPr id="8" name="Image 7"/>
+          <p:cNvPicPr>
+            <a:picLocks noChangeAspect="1"/>
+          </p:cNvPicPr>
+          <p:nvPr/>
+        </p:nvPicPr>
+        <p:blipFill>
+          <a:blip r:embed="rId3">
+            <a:extLst>
+              <a:ext uri="{28A0092B-C50C-407E-A947-70E740481C1C}">
+                <a14:useLocalDpi xmlns:a14="http://schemas.microsoft.com/office/drawing/2010/main" val="0"/>
+              </a:ext>
+            </a:extLst>
+          </a:blip>
+          <a:stretch>
+            <a:fillRect/>
+          </a:stretch>
+        </p:blipFill>
+        <p:spPr>
+          <a:xfrm>
+            <a:off x="10173376" y="317398"/>
+            <a:ext cx="1713838" cy="1497955"/>
+          </a:xfrm>
+          <a:prstGeom prst="rect">
+            <a:avLst/>
+          </a:prstGeom>
+        </p:spPr>
+      </p:pic>
+      <p:sp>
+        <p:nvSpPr>
+          <p:cNvPr id="2" name="ZoneTexte 1"/>
           <p:cNvSpPr txBox="1"/>
           <p:nvPr/>
         </p:nvSpPr>
         <p:spPr>
           <a:xfrm>
-            <a:off x="2279844" y="5578475"/>
-            <a:ext cx="7156256" cy="646331"/>
+            <a:off x="1130479" y="5291508"/>
+            <a:ext cx="6252883" cy="646331"/>
           </a:xfrm>
           <a:prstGeom prst="rect">
             <a:avLst/>
@@ -8318,82 +9764,17 @@
           </a:bodyPr>
           <a:lstStyle/>
           <a:p>
-            <a:pPr algn="just"/>
+            <a:r>
+              <a:rPr lang="en-US" dirty="0"/>
+              <a:t>The registration page allows a new user to register to access </a:t>
+            </a:r>
             <a:r>
               <a:rPr lang="en-US" dirty="0" smtClean="0"/>
-              <a:t>La page </a:t>
-            </a:r>
-            <a:r>
-              <a:rPr lang="en-US" dirty="0" err="1" smtClean="0"/>
-              <a:t>d’accueil</a:t>
-            </a:r>
-            <a:r>
-              <a:rPr lang="en-US" dirty="0" smtClean="0"/>
-              <a:t> se </a:t>
-            </a:r>
-            <a:r>
-              <a:rPr lang="en-US" dirty="0" err="1" smtClean="0"/>
-              <a:t>présente</a:t>
-            </a:r>
-            <a:r>
-              <a:rPr lang="en-US" dirty="0" smtClean="0"/>
-              <a:t> sous la </a:t>
-            </a:r>
-            <a:r>
-              <a:rPr lang="en-US" dirty="0" err="1" smtClean="0"/>
-              <a:t>forme</a:t>
-            </a:r>
-            <a:r>
-              <a:rPr lang="en-US" dirty="0" smtClean="0"/>
-              <a:t> d’un </a:t>
-            </a:r>
-            <a:r>
-              <a:rPr lang="en-US" dirty="0" err="1" smtClean="0"/>
-              <a:t>calendrier</a:t>
-            </a:r>
-            <a:r>
-              <a:rPr lang="en-US" dirty="0" smtClean="0"/>
-              <a:t> </a:t>
-            </a:r>
-            <a:r>
-              <a:rPr lang="en-US" dirty="0" err="1" smtClean="0"/>
-              <a:t>affichant</a:t>
-            </a:r>
-            <a:r>
-              <a:rPr lang="en-US" dirty="0" smtClean="0"/>
-              <a:t> </a:t>
-            </a:r>
-            <a:r>
-              <a:rPr lang="en-US" dirty="0" err="1" smtClean="0"/>
-              <a:t>toutes</a:t>
-            </a:r>
-            <a:r>
-              <a:rPr lang="en-US" dirty="0" smtClean="0"/>
-              <a:t> les </a:t>
-            </a:r>
-            <a:r>
-              <a:rPr lang="en-US" dirty="0" err="1" smtClean="0"/>
-              <a:t>tâches</a:t>
-            </a:r>
-            <a:r>
-              <a:rPr lang="en-US" dirty="0" smtClean="0"/>
-              <a:t> pour le </a:t>
-            </a:r>
-            <a:r>
-              <a:rPr lang="en-US" dirty="0" err="1" smtClean="0"/>
-              <a:t>mois</a:t>
-            </a:r>
-            <a:r>
-              <a:rPr lang="en-US" dirty="0" smtClean="0"/>
-              <a:t> </a:t>
-            </a:r>
-            <a:r>
-              <a:rPr lang="en-US" dirty="0" err="1" smtClean="0"/>
-              <a:t>selectionné</a:t>
+              <a:t>functionalities of </a:t>
             </a:r>
             <a:r>
               <a:rPr lang="en-US" dirty="0"/>
-              <a:t>.</a:t>
+              <a:t>the application.</a:t>
             </a:r>
           </a:p>
         </p:txBody>
@@ -8401,13 +9782,25 @@
     </p:spTree>
     <p:extLst>
       <p:ext uri="{BB962C8B-B14F-4D97-AF65-F5344CB8AC3E}">
-        <p14:creationId xmlns:p14="http://schemas.microsoft.com/office/powerpoint/2010/main" val="77786047"/>
+        <p14:creationId xmlns:p14="http://schemas.microsoft.com/office/powerpoint/2010/main" val="2122471268"/>
       </p:ext>
     </p:extLst>
   </p:cSld>
   <p:clrMapOvr>
     <a:masterClrMapping/>
   </p:clrMapOvr>
+  <mc:AlternateContent xmlns:mc="http://schemas.openxmlformats.org/markup-compatibility/2006">
+    <mc:Choice xmlns:p14="http://schemas.microsoft.com/office/powerpoint/2010/main" Requires="p14">
+      <p:transition spd="slow" p14:dur="1500">
+        <p14:window dir="vert"/>
+      </p:transition>
+    </mc:Choice>
+    <mc:Fallback>
+      <p:transition spd="slow">
+        <p:fade/>
+      </p:transition>
+    </mc:Fallback>
+  </mc:AlternateContent>
   <p:timing>
     <p:tnLst>
       <p:par>
@@ -8437,6 +9830,52 @@
       </p:grpSpPr>
       <p:sp>
         <p:nvSpPr>
+          <p:cNvPr id="3" name="Rectangle 2"/>
+          <p:cNvSpPr/>
+          <p:nvPr/>
+        </p:nvSpPr>
+        <p:spPr>
+          <a:xfrm>
+            <a:off x="8427413" y="5913437"/>
+            <a:ext cx="1617540" cy="334963"/>
+          </a:xfrm>
+          <a:prstGeom prst="rect">
+            <a:avLst/>
+          </a:prstGeom>
+          <a:solidFill>
+            <a:srgbClr val="1E78A7"/>
+          </a:solidFill>
+          <a:ln>
+            <a:noFill/>
+          </a:ln>
+        </p:spPr>
+        <p:style>
+          <a:lnRef idx="2">
+            <a:schemeClr val="accent1">
+              <a:shade val="50000"/>
+            </a:schemeClr>
+          </a:lnRef>
+          <a:fillRef idx="1">
+            <a:schemeClr val="accent1"/>
+          </a:fillRef>
+          <a:effectRef idx="0">
+            <a:schemeClr val="accent1"/>
+          </a:effectRef>
+          <a:fontRef idx="minor">
+            <a:schemeClr val="lt1"/>
+          </a:fontRef>
+        </p:style>
+        <p:txBody>
+          <a:bodyPr rtlCol="0" anchor="ctr"/>
+          <a:lstStyle/>
+          <a:p>
+            <a:pPr algn="ctr"/>
+            <a:endParaRPr lang="en-US"/>
+          </a:p>
+        </p:txBody>
+      </p:sp>
+      <p:sp>
+        <p:nvSpPr>
           <p:cNvPr id="7" name="Titre 6"/>
           <p:cNvSpPr>
             <a:spLocks noGrp="1"/>
@@ -8447,8 +9886,8 @@
         </p:nvSpPr>
         <p:spPr>
           <a:xfrm>
-            <a:off x="1344612" y="550332"/>
-            <a:ext cx="8534400" cy="1507067"/>
+            <a:off x="0" y="-16009"/>
+            <a:ext cx="12192000" cy="913266"/>
           </a:xfrm>
         </p:spPr>
         <p:txBody>
@@ -8457,8 +9896,8 @@
           <a:p>
             <a:pPr algn="ctr"/>
             <a:r>
-              <a:rPr lang="en-US" dirty="0" err="1" smtClean="0"/>
-              <a:t>L’inscription</a:t>
+              <a:rPr lang="en-US" dirty="0" smtClean="0"/>
+              <a:t>Connection</a:t>
             </a:r>
             <a:endParaRPr lang="en-US" dirty="0"/>
           </a:p>
@@ -8489,14 +9928,183 @@
       </p:sp>
       <p:pic>
         <p:nvPicPr>
-          <p:cNvPr id="5" name="Image 4"/>
+          <p:cNvPr id="2" name="Image 1"/>
+          <p:cNvPicPr>
+            <a:picLocks noChangeAspect="1"/>
+          </p:cNvPicPr>
+          <p:nvPr/>
+        </p:nvPicPr>
+        <p:blipFill rotWithShape="1">
+          <a:blip r:embed="rId2"/>
+          <a:srcRect l="7275" t="11260" r="7275" b="15129"/>
+          <a:stretch/>
+        </p:blipFill>
+        <p:spPr>
+          <a:xfrm>
+            <a:off x="459903" y="897257"/>
+            <a:ext cx="4760686" cy="2305763"/>
+          </a:xfrm>
+          <a:prstGeom prst="rect">
+            <a:avLst/>
+          </a:prstGeom>
+        </p:spPr>
+      </p:pic>
+      <p:pic>
+        <p:nvPicPr>
+          <p:cNvPr id="12" name="Image 11"/>
+          <p:cNvPicPr>
+            <a:picLocks noChangeAspect="1"/>
+          </p:cNvPicPr>
+          <p:nvPr/>
+        </p:nvPicPr>
+        <p:blipFill rotWithShape="1">
+          <a:blip r:embed="rId3"/>
+          <a:srcRect l="7833" t="12849" r="7833" b="17707"/>
+          <a:stretch/>
+        </p:blipFill>
+        <p:spPr>
+          <a:xfrm>
+            <a:off x="463031" y="3710864"/>
+            <a:ext cx="4757558" cy="2202573"/>
+          </a:xfrm>
+          <a:prstGeom prst="rect">
+            <a:avLst/>
+          </a:prstGeom>
+        </p:spPr>
+      </p:pic>
+      <p:pic>
+        <p:nvPicPr>
+          <p:cNvPr id="13" name="Image 12"/>
+          <p:cNvPicPr>
+            <a:picLocks noChangeAspect="1"/>
+          </p:cNvPicPr>
+          <p:nvPr/>
+        </p:nvPicPr>
+        <p:blipFill rotWithShape="1">
+          <a:blip r:embed="rId4"/>
+          <a:srcRect l="7610" t="12252" r="7610" b="16518"/>
+          <a:stretch/>
+        </p:blipFill>
+        <p:spPr>
+          <a:xfrm>
+            <a:off x="6096000" y="3710864"/>
+            <a:ext cx="4662827" cy="2202573"/>
+          </a:xfrm>
+          <a:prstGeom prst="rect">
+            <a:avLst/>
+          </a:prstGeom>
+        </p:spPr>
+      </p:pic>
+      <p:sp>
+        <p:nvSpPr>
+          <p:cNvPr id="14" name="ZoneTexte 13"/>
+          <p:cNvSpPr txBox="1"/>
+          <p:nvPr/>
+        </p:nvSpPr>
+        <p:spPr>
+          <a:xfrm>
+            <a:off x="295503" y="5959603"/>
+            <a:ext cx="5174655" cy="646331"/>
+          </a:xfrm>
+          <a:prstGeom prst="rect">
+            <a:avLst/>
+          </a:prstGeom>
+          <a:noFill/>
+        </p:spPr>
+        <p:txBody>
+          <a:bodyPr wrap="square" rtlCol="0">
+            <a:spAutoFit/>
+          </a:bodyPr>
+          <a:lstStyle/>
+          <a:p>
+            <a:pPr algn="ctr"/>
+            <a:r>
+              <a:rPr lang="en-US" dirty="0"/>
+              <a:t>session member with management tasks tab and the Account Management tab</a:t>
+            </a:r>
+            <a:endParaRPr lang="en-US" dirty="0"/>
+          </a:p>
+        </p:txBody>
+      </p:sp>
+      <p:sp>
+        <p:nvSpPr>
+          <p:cNvPr id="15" name="ZoneTexte 14"/>
+          <p:cNvSpPr txBox="1"/>
+          <p:nvPr/>
+        </p:nvSpPr>
+        <p:spPr>
+          <a:xfrm>
+            <a:off x="5847611" y="5913437"/>
+            <a:ext cx="4911216" cy="646331"/>
+          </a:xfrm>
+          <a:prstGeom prst="rect">
+            <a:avLst/>
+          </a:prstGeom>
+          <a:noFill/>
+        </p:spPr>
+        <p:txBody>
+          <a:bodyPr wrap="square" rtlCol="0">
+            <a:spAutoFit/>
+          </a:bodyPr>
+          <a:lstStyle/>
+          <a:p>
+            <a:pPr algn="ctr"/>
+            <a:r>
+              <a:rPr lang="en-US" dirty="0"/>
+              <a:t>Administrator session with </a:t>
+            </a:r>
+            <a:r>
+              <a:rPr lang="en-US" dirty="0" smtClean="0"/>
+              <a:t>the </a:t>
+            </a:r>
+            <a:r>
+              <a:rPr lang="en-US" dirty="0"/>
+              <a:t>user management tab</a:t>
+            </a:r>
+            <a:endParaRPr lang="en-US" dirty="0"/>
+          </a:p>
+        </p:txBody>
+      </p:sp>
+      <p:sp>
+        <p:nvSpPr>
+          <p:cNvPr id="17" name="ZoneTexte 16"/>
+          <p:cNvSpPr txBox="1"/>
+          <p:nvPr/>
+        </p:nvSpPr>
+        <p:spPr>
+          <a:xfrm>
+            <a:off x="5470158" y="1732112"/>
+            <a:ext cx="4703218" cy="646331"/>
+          </a:xfrm>
+          <a:prstGeom prst="rect">
+            <a:avLst/>
+          </a:prstGeom>
+          <a:noFill/>
+        </p:spPr>
+        <p:txBody>
+          <a:bodyPr wrap="square" rtlCol="0">
+            <a:spAutoFit/>
+          </a:bodyPr>
+          <a:lstStyle/>
+          <a:p>
+            <a:r>
+              <a:rPr lang="en-US" dirty="0"/>
+              <a:t>The connection allows a user session with the appearance of new tabs</a:t>
+            </a:r>
+            <a:endParaRPr lang="en-US" dirty="0"/>
+          </a:p>
+        </p:txBody>
+      </p:sp>
+      <p:pic>
+        <p:nvPicPr>
+          <p:cNvPr id="19" name="Image 18"/>
           <p:cNvPicPr>
             <a:picLocks noChangeAspect="1"/>
           </p:cNvPicPr>
           <p:nvPr/>
         </p:nvPicPr>
         <p:blipFill>
-          <a:blip r:embed="rId2">
+          <a:blip r:embed="rId5">
             <a:extLst>
               <a:ext uri="{28A0092B-C50C-407E-A947-70E740481C1C}">
                 <a14:useLocalDpi xmlns:a14="http://schemas.microsoft.com/office/drawing/2010/main" val="0"/>
@@ -8509,24 +10117,100 @@
         </p:blipFill>
         <p:spPr>
           <a:xfrm>
-            <a:off x="2634834" y="1666655"/>
-            <a:ext cx="5953956" cy="3143689"/>
+            <a:off x="10173376" y="317398"/>
+            <a:ext cx="1713838" cy="1497955"/>
           </a:xfrm>
           <a:prstGeom prst="rect">
             <a:avLst/>
           </a:prstGeom>
         </p:spPr>
       </p:pic>
+      <p:pic>
+        <p:nvPicPr>
+          <p:cNvPr id="5" name="Image 4"/>
+          <p:cNvPicPr>
+            <a:picLocks noChangeAspect="1"/>
+          </p:cNvPicPr>
+          <p:nvPr/>
+        </p:nvPicPr>
+        <p:blipFill rotWithShape="1">
+          <a:blip r:embed="rId6"/>
+          <a:srcRect l="39320" t="22602" r="36496" b="54452"/>
+          <a:stretch/>
+        </p:blipFill>
+        <p:spPr>
+          <a:xfrm>
+            <a:off x="1902653" y="1565108"/>
+            <a:ext cx="1818485" cy="970061"/>
+          </a:xfrm>
+          <a:prstGeom prst="rect">
+            <a:avLst/>
+          </a:prstGeom>
+        </p:spPr>
+      </p:pic>
+      <p:sp>
+        <p:nvSpPr>
+          <p:cNvPr id="8" name="Ellipse 7"/>
+          <p:cNvSpPr/>
+          <p:nvPr/>
+        </p:nvSpPr>
+        <p:spPr>
+          <a:xfrm>
+            <a:off x="4598894" y="1035424"/>
+            <a:ext cx="524435" cy="389964"/>
+          </a:xfrm>
+          <a:prstGeom prst="ellipse">
+            <a:avLst/>
+          </a:prstGeom>
+          <a:noFill/>
+        </p:spPr>
+        <p:style>
+          <a:lnRef idx="2">
+            <a:schemeClr val="accent1">
+              <a:shade val="50000"/>
+            </a:schemeClr>
+          </a:lnRef>
+          <a:fillRef idx="1">
+            <a:schemeClr val="accent1"/>
+          </a:fillRef>
+          <a:effectRef idx="0">
+            <a:schemeClr val="accent1"/>
+          </a:effectRef>
+          <a:fontRef idx="minor">
+            <a:schemeClr val="lt1"/>
+          </a:fontRef>
+        </p:style>
+        <p:txBody>
+          <a:bodyPr rtlCol="0" anchor="ctr"/>
+          <a:lstStyle/>
+          <a:p>
+            <a:pPr algn="ctr"/>
+            <a:endParaRPr lang="en-US"/>
+          </a:p>
+        </p:txBody>
+      </p:sp>
     </p:spTree>
     <p:extLst>
       <p:ext uri="{BB962C8B-B14F-4D97-AF65-F5344CB8AC3E}">
-        <p14:creationId xmlns:p14="http://schemas.microsoft.com/office/powerpoint/2010/main" val="2122471268"/>
+        <p14:creationId xmlns:p14="http://schemas.microsoft.com/office/powerpoint/2010/main" val="149689157"/>
       </p:ext>
     </p:extLst>
   </p:cSld>
   <p:clrMapOvr>
     <a:masterClrMapping/>
   </p:clrMapOvr>
+  <mc:AlternateContent xmlns:mc="http://schemas.openxmlformats.org/markup-compatibility/2006">
+    <mc:Choice xmlns:p14="http://schemas.microsoft.com/office/powerpoint/2010/main" Requires="p14">
+      <p:transition spd="slow" p14:dur="1600">
+        <p14:conveyor dir="l"/>
+      </p:transition>
+    </mc:Choice>
+    <mc:Fallback>
+      <p:transition spd="slow">
+        <p:fade/>
+      </p:transition>
+    </mc:Fallback>
+  </mc:AlternateContent>
   <p:timing>
     <p:tnLst>
       <p:par>
@@ -8556,7 +10240,7 @@
       </p:grpSpPr>
       <p:sp>
         <p:nvSpPr>
-          <p:cNvPr id="7" name="Titre 6"/>
+          <p:cNvPr id="2" name="Titre 1"/>
           <p:cNvSpPr>
             <a:spLocks noGrp="1"/>
           </p:cNvSpPr>
@@ -8566,8 +10250,8 @@
         </p:nvSpPr>
         <p:spPr>
           <a:xfrm>
-            <a:off x="0" y="-16009"/>
-            <a:ext cx="12192000" cy="913266"/>
+            <a:off x="0" y="0"/>
+            <a:ext cx="12192000" cy="1507067"/>
           </a:xfrm>
         </p:spPr>
         <p:txBody>
@@ -8576,12 +10260,8 @@
           <a:p>
             <a:pPr algn="ctr"/>
             <a:r>
-              <a:rPr lang="en-US" dirty="0" smtClean="0"/>
-              <a:t>La </a:t>
-            </a:r>
-            <a:r>
-              <a:rPr lang="en-US" dirty="0" err="1" smtClean="0"/>
-              <a:t>connexion</a:t>
+              <a:rPr lang="en-US" dirty="0"/>
+              <a:t>task management</a:t>
             </a:r>
             <a:endParaRPr lang="en-US" dirty="0"/>
           </a:p>
@@ -8612,21 +10292,28 @@
       </p:sp>
       <p:pic>
         <p:nvPicPr>
-          <p:cNvPr id="2" name="Image 1"/>
+          <p:cNvPr id="6" name="Image 5"/>
           <p:cNvPicPr>
             <a:picLocks noChangeAspect="1"/>
           </p:cNvPicPr>
           <p:nvPr/>
         </p:nvPicPr>
-        <p:blipFill rotWithShape="1">
-          <a:blip r:embed="rId2"/>
-          <a:srcRect l="7275" t="11260" r="7275" b="15129"/>
-          <a:stretch/>
+        <p:blipFill>
+          <a:blip r:embed="rId2">
+            <a:extLst>
+              <a:ext uri="{28A0092B-C50C-407E-A947-70E740481C1C}">
+                <a14:useLocalDpi xmlns:a14="http://schemas.microsoft.com/office/drawing/2010/main" val="0"/>
+              </a:ext>
+            </a:extLst>
+          </a:blip>
+          <a:stretch>
+            <a:fillRect/>
+          </a:stretch>
         </p:blipFill>
         <p:spPr>
           <a:xfrm>
-            <a:off x="1" y="928915"/>
-            <a:ext cx="4760686" cy="2305763"/>
+            <a:off x="10173376" y="317398"/>
+            <a:ext cx="1713838" cy="1497955"/>
           </a:xfrm>
           <a:prstGeom prst="rect">
             <a:avLst/>
@@ -8635,41 +10322,43 @@
       </p:pic>
       <p:sp>
         <p:nvSpPr>
-          <p:cNvPr id="9" name="Flèche gauche 8"/>
-          <p:cNvSpPr/>
+          <p:cNvPr id="9" name="ZoneTexte 8"/>
+          <p:cNvSpPr txBox="1"/>
           <p:nvPr/>
         </p:nvSpPr>
         <p:spPr>
           <a:xfrm>
-            <a:off x="4585926" y="1167398"/>
-            <a:ext cx="464849" cy="217714"/>
-          </a:xfrm>
-          <a:prstGeom prst="leftArrow">
+            <a:off x="2383639" y="5389511"/>
+            <a:ext cx="6830358" cy="646331"/>
+          </a:xfrm>
+          <a:prstGeom prst="rect">
             <a:avLst/>
           </a:prstGeom>
-        </p:spPr>
-        <p:style>
-          <a:lnRef idx="2">
-            <a:schemeClr val="accent1">
-              <a:shade val="50000"/>
-            </a:schemeClr>
-          </a:lnRef>
-          <a:fillRef idx="1">
-            <a:schemeClr val="accent1"/>
-          </a:fillRef>
-          <a:effectRef idx="0">
-            <a:schemeClr val="accent1"/>
-          </a:effectRef>
-          <a:fontRef idx="minor">
-            <a:schemeClr val="lt1"/>
-          </a:fontRef>
-        </p:style>
-        <p:txBody>
-          <a:bodyPr rtlCol="0" anchor="ctr"/>
-          <a:lstStyle/>
-          <a:p>
-            <a:pPr algn="ctr"/>
-            <a:endParaRPr lang="en-US"/>
+          <a:noFill/>
+        </p:spPr>
+        <p:txBody>
+          <a:bodyPr wrap="square" rtlCol="0">
+            <a:spAutoFit/>
+          </a:bodyPr>
+          <a:lstStyle/>
+          <a:p>
+            <a:r>
+              <a:rPr lang="en-US" dirty="0"/>
+              <a:t>Task management allows a </a:t>
+            </a:r>
+            <a:r>
+              <a:rPr lang="en-US" dirty="0" smtClean="0"/>
+              <a:t>connected user to visualize the tasks for which he is registered, and also create </a:t>
+            </a:r>
+            <a:r>
+              <a:rPr lang="en-US" dirty="0"/>
+              <a:t>new </a:t>
+            </a:r>
+            <a:r>
+              <a:rPr lang="en-US" dirty="0" smtClean="0"/>
+              <a:t>tasks.</a:t>
+            </a:r>
+            <a:endParaRPr lang="en-US" dirty="0"/>
           </a:p>
         </p:txBody>
       </p:sp>
@@ -8682,273 +10371,48 @@
           <p:nvPr/>
         </p:nvPicPr>
         <p:blipFill rotWithShape="1">
-          <a:blip r:embed="rId3"/>
-          <a:srcRect l="39849" t="23164" r="33936" b="53423"/>
+          <a:blip r:embed="rId3">
+            <a:extLst>
+              <a:ext uri="{28A0092B-C50C-407E-A947-70E740481C1C}">
+                <a14:useLocalDpi xmlns:a14="http://schemas.microsoft.com/office/drawing/2010/main" val="0"/>
+              </a:ext>
+            </a:extLst>
+          </a:blip>
+          <a:srcRect l="5051" t="12951" r="3535" b="6202"/>
           <a:stretch/>
         </p:blipFill>
         <p:spPr>
           <a:xfrm>
-            <a:off x="1360616" y="1569762"/>
-            <a:ext cx="2039455" cy="1024068"/>
+            <a:off x="2084068" y="1507067"/>
+            <a:ext cx="7429500" cy="3694227"/>
           </a:xfrm>
           <a:prstGeom prst="rect">
             <a:avLst/>
           </a:prstGeom>
         </p:spPr>
       </p:pic>
-      <p:sp>
-        <p:nvSpPr>
-          <p:cNvPr id="11" name="Flèche gauche 10"/>
-          <p:cNvSpPr/>
-          <p:nvPr/>
-        </p:nvSpPr>
-        <p:spPr>
-          <a:xfrm>
-            <a:off x="3394473" y="1958426"/>
-            <a:ext cx="1946391" cy="283027"/>
-          </a:xfrm>
-          <a:prstGeom prst="leftArrow">
-            <a:avLst/>
-          </a:prstGeom>
-        </p:spPr>
-        <p:style>
-          <a:lnRef idx="2">
-            <a:schemeClr val="accent1">
-              <a:shade val="50000"/>
-            </a:schemeClr>
-          </a:lnRef>
-          <a:fillRef idx="1">
-            <a:schemeClr val="accent1"/>
-          </a:fillRef>
-          <a:effectRef idx="0">
-            <a:schemeClr val="accent1"/>
-          </a:effectRef>
-          <a:fontRef idx="minor">
-            <a:schemeClr val="lt1"/>
-          </a:fontRef>
-        </p:style>
-        <p:txBody>
-          <a:bodyPr rtlCol="0" anchor="ctr"/>
-          <a:lstStyle/>
-          <a:p>
-            <a:pPr algn="ctr"/>
-            <a:endParaRPr lang="en-US"/>
-          </a:p>
-        </p:txBody>
-      </p:sp>
-      <p:pic>
-        <p:nvPicPr>
-          <p:cNvPr id="12" name="Image 11"/>
-          <p:cNvPicPr>
-            <a:picLocks noChangeAspect="1"/>
-          </p:cNvPicPr>
-          <p:nvPr/>
-        </p:nvPicPr>
-        <p:blipFill rotWithShape="1">
-          <a:blip r:embed="rId4"/>
-          <a:srcRect l="7833" t="12849" r="7833" b="17707"/>
-          <a:stretch/>
-        </p:blipFill>
-        <p:spPr>
-          <a:xfrm>
-            <a:off x="313443" y="3758471"/>
-            <a:ext cx="5053606" cy="2339632"/>
-          </a:xfrm>
-          <a:prstGeom prst="rect">
-            <a:avLst/>
-          </a:prstGeom>
-        </p:spPr>
-      </p:pic>
-      <p:pic>
-        <p:nvPicPr>
-          <p:cNvPr id="13" name="Image 12"/>
-          <p:cNvPicPr>
-            <a:picLocks noChangeAspect="1"/>
-          </p:cNvPicPr>
-          <p:nvPr/>
-        </p:nvPicPr>
-        <p:blipFill rotWithShape="1">
-          <a:blip r:embed="rId5"/>
-          <a:srcRect l="7610" t="12252" r="7610" b="16518"/>
-          <a:stretch/>
-        </p:blipFill>
-        <p:spPr>
-          <a:xfrm>
-            <a:off x="6096000" y="3758471"/>
-            <a:ext cx="4952980" cy="2339632"/>
-          </a:xfrm>
-          <a:prstGeom prst="rect">
-            <a:avLst/>
-          </a:prstGeom>
-        </p:spPr>
-      </p:pic>
-      <p:sp>
-        <p:nvSpPr>
-          <p:cNvPr id="14" name="ZoneTexte 13"/>
-          <p:cNvSpPr txBox="1"/>
-          <p:nvPr/>
-        </p:nvSpPr>
-        <p:spPr>
-          <a:xfrm>
-            <a:off x="1360616" y="6063734"/>
-            <a:ext cx="2630813" cy="369332"/>
-          </a:xfrm>
-          <a:prstGeom prst="rect">
-            <a:avLst/>
-          </a:prstGeom>
-          <a:noFill/>
-        </p:spPr>
-        <p:txBody>
-          <a:bodyPr wrap="square" rtlCol="0">
-            <a:spAutoFit/>
-          </a:bodyPr>
-          <a:lstStyle/>
-          <a:p>
-            <a:pPr algn="ctr"/>
-            <a:r>
-              <a:rPr lang="en-US" dirty="0" smtClean="0"/>
-              <a:t>Session </a:t>
-            </a:r>
-            <a:r>
-              <a:rPr lang="en-US" dirty="0" err="1" smtClean="0"/>
-              <a:t>membre</a:t>
-            </a:r>
-            <a:endParaRPr lang="en-US" dirty="0"/>
-          </a:p>
-        </p:txBody>
-      </p:sp>
-      <p:sp>
-        <p:nvSpPr>
-          <p:cNvPr id="15" name="ZoneTexte 14"/>
-          <p:cNvSpPr txBox="1"/>
-          <p:nvPr/>
-        </p:nvSpPr>
-        <p:spPr>
-          <a:xfrm>
-            <a:off x="7257083" y="6098103"/>
-            <a:ext cx="2630813" cy="369332"/>
-          </a:xfrm>
-          <a:prstGeom prst="rect">
-            <a:avLst/>
-          </a:prstGeom>
-          <a:noFill/>
-        </p:spPr>
-        <p:txBody>
-          <a:bodyPr wrap="square" rtlCol="0">
-            <a:spAutoFit/>
-          </a:bodyPr>
-          <a:lstStyle/>
-          <a:p>
-            <a:pPr algn="ctr"/>
-            <a:r>
-              <a:rPr lang="en-US" dirty="0" smtClean="0"/>
-              <a:t>Session </a:t>
-            </a:r>
-            <a:r>
-              <a:rPr lang="en-US" dirty="0" err="1" smtClean="0"/>
-              <a:t>administrateur</a:t>
-            </a:r>
-            <a:endParaRPr lang="en-US" dirty="0"/>
-          </a:p>
-        </p:txBody>
-      </p:sp>
-      <p:sp>
-        <p:nvSpPr>
-          <p:cNvPr id="17" name="ZoneTexte 16"/>
-          <p:cNvSpPr txBox="1"/>
-          <p:nvPr/>
-        </p:nvSpPr>
-        <p:spPr>
-          <a:xfrm>
-            <a:off x="5340864" y="1854937"/>
-            <a:ext cx="4703218" cy="646331"/>
-          </a:xfrm>
-          <a:prstGeom prst="rect">
-            <a:avLst/>
-          </a:prstGeom>
-          <a:noFill/>
-        </p:spPr>
-        <p:txBody>
-          <a:bodyPr wrap="square" rtlCol="0">
-            <a:spAutoFit/>
-          </a:bodyPr>
-          <a:lstStyle/>
-          <a:p>
-            <a:r>
-              <a:rPr lang="en-US" dirty="0" err="1" smtClean="0"/>
-              <a:t>Lors</a:t>
-            </a:r>
-            <a:r>
-              <a:rPr lang="en-US" dirty="0" smtClean="0"/>
-              <a:t> du </a:t>
-            </a:r>
-            <a:r>
-              <a:rPr lang="en-US" dirty="0" err="1" smtClean="0"/>
-              <a:t>clic</a:t>
-            </a:r>
-            <a:r>
-              <a:rPr lang="en-US" dirty="0" smtClean="0"/>
-              <a:t>, apparition du popup de </a:t>
-            </a:r>
-            <a:r>
-              <a:rPr lang="en-US" dirty="0" err="1" smtClean="0"/>
-              <a:t>connexion</a:t>
-            </a:r>
-            <a:r>
-              <a:rPr lang="en-US" dirty="0"/>
-              <a:t>.</a:t>
-            </a:r>
-          </a:p>
-        </p:txBody>
-      </p:sp>
-      <p:sp>
-        <p:nvSpPr>
-          <p:cNvPr id="18" name="ZoneTexte 17"/>
-          <p:cNvSpPr txBox="1"/>
-          <p:nvPr/>
-        </p:nvSpPr>
-        <p:spPr>
-          <a:xfrm>
-            <a:off x="5050775" y="1091589"/>
-            <a:ext cx="4703218" cy="369332"/>
-          </a:xfrm>
-          <a:prstGeom prst="rect">
-            <a:avLst/>
-          </a:prstGeom>
-          <a:noFill/>
-        </p:spPr>
-        <p:txBody>
-          <a:bodyPr wrap="square" rtlCol="0">
-            <a:spAutoFit/>
-          </a:bodyPr>
-          <a:lstStyle/>
-          <a:p>
-            <a:r>
-              <a:rPr lang="en-US" dirty="0" err="1" smtClean="0"/>
-              <a:t>Bouton</a:t>
-            </a:r>
-            <a:r>
-              <a:rPr lang="en-US" dirty="0" smtClean="0"/>
-              <a:t> de </a:t>
-            </a:r>
-            <a:r>
-              <a:rPr lang="en-US" dirty="0" err="1" smtClean="0"/>
-              <a:t>connexion</a:t>
-            </a:r>
-            <a:endParaRPr lang="en-US" dirty="0"/>
-          </a:p>
-        </p:txBody>
-      </p:sp>
     </p:spTree>
     <p:extLst>
       <p:ext uri="{BB962C8B-B14F-4D97-AF65-F5344CB8AC3E}">
-        <p14:creationId xmlns:p14="http://schemas.microsoft.com/office/powerpoint/2010/main" val="149689157"/>
+        <p14:creationId xmlns:p14="http://schemas.microsoft.com/office/powerpoint/2010/main" val="2648625771"/>
       </p:ext>
     </p:extLst>
   </p:cSld>
   <p:clrMapOvr>
     <a:masterClrMapping/>
   </p:clrMapOvr>
+  <mc:AlternateContent xmlns:mc="http://schemas.openxmlformats.org/markup-compatibility/2006">
+    <mc:Choice xmlns:p14="http://schemas.microsoft.com/office/powerpoint/2010/main" Requires="p14">
+      <p:transition spd="slow" p14:dur="1600">
+        <p14:conveyor dir="l"/>
+      </p:transition>
+    </mc:Choice>
+    <mc:Fallback>
+      <p:transition spd="slow">
+        <p:fade/>
+      </p:transition>
+    </mc:Fallback>
+  </mc:AlternateContent>
   <p:timing>
     <p:tnLst>
       <p:par>

</xml_diff>